<commit_message>
added figures, updated background
</commit_message>
<xml_diff>
--- a/final_report/graphics/easylinkrx_bug.pptx
+++ b/final_report/graphics/easylinkrx_bug.pptx
@@ -2,12 +2,12 @@
 <file path=ppt/presentation.xml><?xml version="1.0" encoding="utf-8"?>
 <p:presentation xmlns:a="http://schemas.openxmlformats.org/drawingml/2006/main" xmlns:r="http://schemas.openxmlformats.org/officeDocument/2006/relationships" xmlns:p="http://schemas.openxmlformats.org/presentationml/2006/main" saveSubsetFonts="1">
   <p:sldMasterIdLst>
-    <p:sldMasterId id="2147483660" r:id="rId1"/>
+    <p:sldMasterId id="2147483684" r:id="rId1"/>
   </p:sldMasterIdLst>
   <p:sldIdLst>
     <p:sldId id="256" r:id="rId2"/>
   </p:sldIdLst>
-  <p:sldSz cx="9144000" cy="6858000" type="screen4x3"/>
+  <p:sldSz cx="7315200" cy="4572000"/>
   <p:notesSz cx="6858000" cy="9144000"/>
   <p:defaultTextStyle>
     <a:defPPr>
@@ -107,12 +107,12 @@
   <p:extLst>
     <p:ext uri="{EFAFB233-063F-42B5-8137-9DF3F51BA10A}">
       <p15:sldGuideLst xmlns:p15="http://schemas.microsoft.com/office/powerpoint/2012/main">
-        <p15:guide id="1" orient="horz" pos="2160" userDrawn="1">
+        <p15:guide id="1" orient="horz" pos="1440" userDrawn="1">
           <p15:clr>
             <a:srgbClr val="A4A3A4"/>
           </p15:clr>
         </p15:guide>
-        <p15:guide id="2" pos="2880" userDrawn="1">
+        <p15:guide id="2" pos="2304" userDrawn="1">
           <p15:clr>
             <a:srgbClr val="A4A3A4"/>
           </p15:clr>
@@ -125,6 +125,222 @@
 
 <file path=ppt/changesInfos/changesInfo1.xml><?xml version="1.0" encoding="utf-8"?>
 <pc:chgInfo xmlns:a="http://schemas.openxmlformats.org/drawingml/2006/main" xmlns:r="http://schemas.openxmlformats.org/officeDocument/2006/relationships" xmlns:ac="http://schemas.microsoft.com/office/drawing/2013/main/command" xmlns:pc="http://schemas.microsoft.com/office/powerpoint/2013/main/command">
+  <pc:docChgLst>
+    <pc:chgData name="Milijana Surbatovich" userId="34f022815c94af0f" providerId="LiveId" clId="{2CA3D2C7-2E1C-4E57-9358-C48053B7FCB8}"/>
+    <pc:docChg chg="custSel modSld">
+      <pc:chgData name="Milijana Surbatovich" userId="34f022815c94af0f" providerId="LiveId" clId="{2CA3D2C7-2E1C-4E57-9358-C48053B7FCB8}" dt="2018-05-07T19:17:59.937" v="28" actId="1076"/>
+      <pc:docMkLst>
+        <pc:docMk/>
+      </pc:docMkLst>
+      <pc:sldChg chg="addSp delSp modSp">
+        <pc:chgData name="Milijana Surbatovich" userId="34f022815c94af0f" providerId="LiveId" clId="{2CA3D2C7-2E1C-4E57-9358-C48053B7FCB8}" dt="2018-05-07T19:17:59.937" v="28" actId="1076"/>
+        <pc:sldMkLst>
+          <pc:docMk/>
+          <pc:sldMk cId="169634896" sldId="256"/>
+        </pc:sldMkLst>
+        <pc:spChg chg="del">
+          <ac:chgData name="Milijana Surbatovich" userId="34f022815c94af0f" providerId="LiveId" clId="{2CA3D2C7-2E1C-4E57-9358-C48053B7FCB8}" dt="2018-05-07T18:53:04.883" v="0" actId="478"/>
+          <ac:spMkLst>
+            <pc:docMk/>
+            <pc:sldMk cId="169634896" sldId="256"/>
+            <ac:spMk id="4" creationId="{4E936606-F1B2-4456-AB69-711456B503DF}"/>
+          </ac:spMkLst>
+        </pc:spChg>
+        <pc:spChg chg="del">
+          <ac:chgData name="Milijana Surbatovich" userId="34f022815c94af0f" providerId="LiveId" clId="{2CA3D2C7-2E1C-4E57-9358-C48053B7FCB8}" dt="2018-05-07T18:53:04.883" v="0" actId="478"/>
+          <ac:spMkLst>
+            <pc:docMk/>
+            <pc:sldMk cId="169634896" sldId="256"/>
+            <ac:spMk id="5" creationId="{642E80F8-A808-489E-8FB1-293379AC7E77}"/>
+          </ac:spMkLst>
+        </pc:spChg>
+        <pc:spChg chg="del">
+          <ac:chgData name="Milijana Surbatovich" userId="34f022815c94af0f" providerId="LiveId" clId="{2CA3D2C7-2E1C-4E57-9358-C48053B7FCB8}" dt="2018-05-07T18:53:04.883" v="0" actId="478"/>
+          <ac:spMkLst>
+            <pc:docMk/>
+            <pc:sldMk cId="169634896" sldId="256"/>
+            <ac:spMk id="11" creationId="{47BAB675-06BD-4A31-ADD7-34F0B9307E64}"/>
+          </ac:spMkLst>
+        </pc:spChg>
+        <pc:spChg chg="del">
+          <ac:chgData name="Milijana Surbatovich" userId="34f022815c94af0f" providerId="LiveId" clId="{2CA3D2C7-2E1C-4E57-9358-C48053B7FCB8}" dt="2018-05-07T18:53:04.883" v="0" actId="478"/>
+          <ac:spMkLst>
+            <pc:docMk/>
+            <pc:sldMk cId="169634896" sldId="256"/>
+            <ac:spMk id="13" creationId="{8ADB68BF-9BFF-4FF4-9529-174171CD8259}"/>
+          </ac:spMkLst>
+        </pc:spChg>
+        <pc:spChg chg="del">
+          <ac:chgData name="Milijana Surbatovich" userId="34f022815c94af0f" providerId="LiveId" clId="{2CA3D2C7-2E1C-4E57-9358-C48053B7FCB8}" dt="2018-05-07T18:53:04.883" v="0" actId="478"/>
+          <ac:spMkLst>
+            <pc:docMk/>
+            <pc:sldMk cId="169634896" sldId="256"/>
+            <ac:spMk id="14" creationId="{51D3ABE6-319E-4C09-A4D3-8A0C02BA9825}"/>
+          </ac:spMkLst>
+        </pc:spChg>
+        <pc:spChg chg="del">
+          <ac:chgData name="Milijana Surbatovich" userId="34f022815c94af0f" providerId="LiveId" clId="{2CA3D2C7-2E1C-4E57-9358-C48053B7FCB8}" dt="2018-05-07T18:53:04.883" v="0" actId="478"/>
+          <ac:spMkLst>
+            <pc:docMk/>
+            <pc:sldMk cId="169634896" sldId="256"/>
+            <ac:spMk id="15" creationId="{47829C96-FF67-4A53-939E-9223E8B51F68}"/>
+          </ac:spMkLst>
+        </pc:spChg>
+        <pc:spChg chg="del">
+          <ac:chgData name="Milijana Surbatovich" userId="34f022815c94af0f" providerId="LiveId" clId="{2CA3D2C7-2E1C-4E57-9358-C48053B7FCB8}" dt="2018-05-07T18:53:04.883" v="0" actId="478"/>
+          <ac:spMkLst>
+            <pc:docMk/>
+            <pc:sldMk cId="169634896" sldId="256"/>
+            <ac:spMk id="16" creationId="{8A8BFFBE-3128-4481-8EC9-78FF1DF26DD2}"/>
+          </ac:spMkLst>
+        </pc:spChg>
+        <pc:spChg chg="del">
+          <ac:chgData name="Milijana Surbatovich" userId="34f022815c94af0f" providerId="LiveId" clId="{2CA3D2C7-2E1C-4E57-9358-C48053B7FCB8}" dt="2018-05-07T18:53:04.883" v="0" actId="478"/>
+          <ac:spMkLst>
+            <pc:docMk/>
+            <pc:sldMk cId="169634896" sldId="256"/>
+            <ac:spMk id="17" creationId="{D28681A7-EF51-4837-920A-2987BB4798C6}"/>
+          </ac:spMkLst>
+        </pc:spChg>
+        <pc:spChg chg="add mod">
+          <ac:chgData name="Milijana Surbatovich" userId="34f022815c94af0f" providerId="LiveId" clId="{2CA3D2C7-2E1C-4E57-9358-C48053B7FCB8}" dt="2018-05-07T19:17:59.937" v="28" actId="1076"/>
+          <ac:spMkLst>
+            <pc:docMk/>
+            <pc:sldMk cId="169634896" sldId="256"/>
+            <ac:spMk id="18" creationId="{4626C16A-FC72-4781-9B8B-96DB1B0F203C}"/>
+          </ac:spMkLst>
+        </pc:spChg>
+        <pc:spChg chg="add mod">
+          <ac:chgData name="Milijana Surbatovich" userId="34f022815c94af0f" providerId="LiveId" clId="{2CA3D2C7-2E1C-4E57-9358-C48053B7FCB8}" dt="2018-05-07T19:17:59.937" v="28" actId="1076"/>
+          <ac:spMkLst>
+            <pc:docMk/>
+            <pc:sldMk cId="169634896" sldId="256"/>
+            <ac:spMk id="19" creationId="{4CCE80B4-87B1-4B23-85C8-B34A25CF164D}"/>
+          </ac:spMkLst>
+        </pc:spChg>
+        <pc:spChg chg="del">
+          <ac:chgData name="Milijana Surbatovich" userId="34f022815c94af0f" providerId="LiveId" clId="{2CA3D2C7-2E1C-4E57-9358-C48053B7FCB8}" dt="2018-05-07T18:53:04.883" v="0" actId="478"/>
+          <ac:spMkLst>
+            <pc:docMk/>
+            <pc:sldMk cId="169634896" sldId="256"/>
+            <ac:spMk id="20" creationId="{C08DE86E-F53D-4B10-9778-144F10C4BC45}"/>
+          </ac:spMkLst>
+        </pc:spChg>
+        <pc:spChg chg="add mod">
+          <ac:chgData name="Milijana Surbatovich" userId="34f022815c94af0f" providerId="LiveId" clId="{2CA3D2C7-2E1C-4E57-9358-C48053B7FCB8}" dt="2018-05-07T19:17:59.937" v="28" actId="1076"/>
+          <ac:spMkLst>
+            <pc:docMk/>
+            <pc:sldMk cId="169634896" sldId="256"/>
+            <ac:spMk id="24" creationId="{42286B17-6D27-4867-BD39-560C1E19963B}"/>
+          </ac:spMkLst>
+        </pc:spChg>
+        <pc:spChg chg="add mod">
+          <ac:chgData name="Milijana Surbatovich" userId="34f022815c94af0f" providerId="LiveId" clId="{2CA3D2C7-2E1C-4E57-9358-C48053B7FCB8}" dt="2018-05-07T19:17:59.937" v="28" actId="1076"/>
+          <ac:spMkLst>
+            <pc:docMk/>
+            <pc:sldMk cId="169634896" sldId="256"/>
+            <ac:spMk id="25" creationId="{3AA3D2A5-E630-4F79-96B4-4BFA4A38EA21}"/>
+          </ac:spMkLst>
+        </pc:spChg>
+        <pc:spChg chg="add mod">
+          <ac:chgData name="Milijana Surbatovich" userId="34f022815c94af0f" providerId="LiveId" clId="{2CA3D2C7-2E1C-4E57-9358-C48053B7FCB8}" dt="2018-05-07T19:17:59.937" v="28" actId="1076"/>
+          <ac:spMkLst>
+            <pc:docMk/>
+            <pc:sldMk cId="169634896" sldId="256"/>
+            <ac:spMk id="26" creationId="{6F930390-6D1D-45FA-8AF1-BB3A4E10DB66}"/>
+          </ac:spMkLst>
+        </pc:spChg>
+        <pc:spChg chg="add mod">
+          <ac:chgData name="Milijana Surbatovich" userId="34f022815c94af0f" providerId="LiveId" clId="{2CA3D2C7-2E1C-4E57-9358-C48053B7FCB8}" dt="2018-05-07T19:17:59.937" v="28" actId="1076"/>
+          <ac:spMkLst>
+            <pc:docMk/>
+            <pc:sldMk cId="169634896" sldId="256"/>
+            <ac:spMk id="27" creationId="{26DB0B34-2BAA-4DD3-AF2D-ACA066D2A22C}"/>
+          </ac:spMkLst>
+        </pc:spChg>
+        <pc:spChg chg="add mod">
+          <ac:chgData name="Milijana Surbatovich" userId="34f022815c94af0f" providerId="LiveId" clId="{2CA3D2C7-2E1C-4E57-9358-C48053B7FCB8}" dt="2018-05-07T19:17:59.937" v="28" actId="1076"/>
+          <ac:spMkLst>
+            <pc:docMk/>
+            <pc:sldMk cId="169634896" sldId="256"/>
+            <ac:spMk id="28" creationId="{D98FE0F3-FBE5-4167-BF20-B25BEB673FFF}"/>
+          </ac:spMkLst>
+        </pc:spChg>
+        <pc:spChg chg="add mod">
+          <ac:chgData name="Milijana Surbatovich" userId="34f022815c94af0f" providerId="LiveId" clId="{2CA3D2C7-2E1C-4E57-9358-C48053B7FCB8}" dt="2018-05-07T19:17:59.937" v="28" actId="1076"/>
+          <ac:spMkLst>
+            <pc:docMk/>
+            <pc:sldMk cId="169634896" sldId="256"/>
+            <ac:spMk id="29" creationId="{128129DE-FE16-4B66-8A66-27EAEAAB38FB}"/>
+          </ac:spMkLst>
+        </pc:spChg>
+        <pc:spChg chg="add mod">
+          <ac:chgData name="Milijana Surbatovich" userId="34f022815c94af0f" providerId="LiveId" clId="{2CA3D2C7-2E1C-4E57-9358-C48053B7FCB8}" dt="2018-05-07T19:17:59.937" v="28" actId="1076"/>
+          <ac:spMkLst>
+            <pc:docMk/>
+            <pc:sldMk cId="169634896" sldId="256"/>
+            <ac:spMk id="30" creationId="{0DF44325-0E0B-433C-A008-6B6DC1EC8D6C}"/>
+          </ac:spMkLst>
+        </pc:spChg>
+        <pc:spChg chg="add del mod">
+          <ac:chgData name="Milijana Surbatovich" userId="34f022815c94af0f" providerId="LiveId" clId="{2CA3D2C7-2E1C-4E57-9358-C48053B7FCB8}" dt="2018-05-07T19:17:15.403" v="26" actId="478"/>
+          <ac:spMkLst>
+            <pc:docMk/>
+            <pc:sldMk cId="169634896" sldId="256"/>
+            <ac:spMk id="31" creationId="{D7CA75ED-8DE2-4B02-8E66-83F85FACA643}"/>
+          </ac:spMkLst>
+        </pc:spChg>
+        <pc:cxnChg chg="del">
+          <ac:chgData name="Milijana Surbatovich" userId="34f022815c94af0f" providerId="LiveId" clId="{2CA3D2C7-2E1C-4E57-9358-C48053B7FCB8}" dt="2018-05-07T18:53:04.883" v="0" actId="478"/>
+          <ac:cxnSpMkLst>
+            <pc:docMk/>
+            <pc:sldMk cId="169634896" sldId="256"/>
+            <ac:cxnSpMk id="7" creationId="{E78BE08A-93AA-4AD6-8B48-9B3A8F615080}"/>
+          </ac:cxnSpMkLst>
+        </pc:cxnChg>
+        <pc:cxnChg chg="del">
+          <ac:chgData name="Milijana Surbatovich" userId="34f022815c94af0f" providerId="LiveId" clId="{2CA3D2C7-2E1C-4E57-9358-C48053B7FCB8}" dt="2018-05-07T18:53:04.883" v="0" actId="478"/>
+          <ac:cxnSpMkLst>
+            <pc:docMk/>
+            <pc:sldMk cId="169634896" sldId="256"/>
+            <ac:cxnSpMk id="8" creationId="{12D8DF9D-8AA2-4A3F-AA1E-32622C0BC06E}"/>
+          </ac:cxnSpMkLst>
+        </pc:cxnChg>
+        <pc:cxnChg chg="del">
+          <ac:chgData name="Milijana Surbatovich" userId="34f022815c94af0f" providerId="LiveId" clId="{2CA3D2C7-2E1C-4E57-9358-C48053B7FCB8}" dt="2018-05-07T18:53:04.883" v="0" actId="478"/>
+          <ac:cxnSpMkLst>
+            <pc:docMk/>
+            <pc:sldMk cId="169634896" sldId="256"/>
+            <ac:cxnSpMk id="10" creationId="{E1A0209C-C8CD-415E-A9CE-156CBC4B6DDC}"/>
+          </ac:cxnSpMkLst>
+        </pc:cxnChg>
+        <pc:cxnChg chg="add mod">
+          <ac:chgData name="Milijana Surbatovich" userId="34f022815c94af0f" providerId="LiveId" clId="{2CA3D2C7-2E1C-4E57-9358-C48053B7FCB8}" dt="2018-05-07T19:17:59.937" v="28" actId="1076"/>
+          <ac:cxnSpMkLst>
+            <pc:docMk/>
+            <pc:sldMk cId="169634896" sldId="256"/>
+            <ac:cxnSpMk id="21" creationId="{7EF4FFD3-C207-4AD3-8776-FEB93D894FF9}"/>
+          </ac:cxnSpMkLst>
+        </pc:cxnChg>
+        <pc:cxnChg chg="add mod">
+          <ac:chgData name="Milijana Surbatovich" userId="34f022815c94af0f" providerId="LiveId" clId="{2CA3D2C7-2E1C-4E57-9358-C48053B7FCB8}" dt="2018-05-07T19:17:59.937" v="28" actId="1076"/>
+          <ac:cxnSpMkLst>
+            <pc:docMk/>
+            <pc:sldMk cId="169634896" sldId="256"/>
+            <ac:cxnSpMk id="22" creationId="{493B2AD1-C8DD-4383-95A6-295C4FC94B6A}"/>
+          </ac:cxnSpMkLst>
+        </pc:cxnChg>
+        <pc:cxnChg chg="add mod">
+          <ac:chgData name="Milijana Surbatovich" userId="34f022815c94af0f" providerId="LiveId" clId="{2CA3D2C7-2E1C-4E57-9358-C48053B7FCB8}" dt="2018-05-07T19:17:59.937" v="28" actId="1076"/>
+          <ac:cxnSpMkLst>
+            <pc:docMk/>
+            <pc:sldMk cId="169634896" sldId="256"/>
+            <ac:cxnSpMk id="23" creationId="{F7717D02-0ED2-4E28-948C-3651F8878C9C}"/>
+          </ac:cxnSpMkLst>
+        </pc:cxnChg>
+      </pc:sldChg>
+    </pc:docChg>
+  </pc:docChgLst>
   <pc:docChgLst>
     <pc:chgData name="Milijana Surbatovich" userId="34f022815c94af0f" providerId="LiveId" clId="{4A52708C-59EB-41FC-A934-BB30B59101DC}"/>
     <pc:docChg chg="undo custSel modSld">
@@ -147,7 +363,7 @@
           </ac:spMkLst>
         </pc:spChg>
         <pc:spChg chg="add del">
-          <ac:chgData name="Milijana Surbatovich" userId="34f022815c94af0f" providerId="LiveId" clId="{4A52708C-59EB-41FC-A934-BB30B59101DC}" dt="2018-04-23T14:00:20.482" v="746"/>
+          <ac:chgData name="Milijana Surbatovich" userId="34f022815c94af0f" providerId="LiveId" clId="{4A52708C-59EB-41FC-A934-BB30B59101DC}" dt="2018-04-23T14:00:20.482" v="746" actId="14100"/>
           <ac:spMkLst>
             <pc:docMk/>
             <pc:sldMk cId="169634896" sldId="256"/>
@@ -421,15 +637,15 @@
         </p:nvSpPr>
         <p:spPr>
           <a:xfrm>
-            <a:off x="685800" y="1122363"/>
-            <a:ext cx="7772400" cy="2387600"/>
+            <a:off x="914400" y="748242"/>
+            <a:ext cx="5486400" cy="1591733"/>
           </a:xfrm>
         </p:spPr>
         <p:txBody>
           <a:bodyPr anchor="b"/>
           <a:lstStyle>
             <a:lvl1pPr algn="ctr">
-              <a:defRPr sz="6000"/>
+              <a:defRPr sz="3600"/>
             </a:lvl1pPr>
           </a:lstStyle>
           <a:p>
@@ -453,8 +669,8 @@
         </p:nvSpPr>
         <p:spPr>
           <a:xfrm>
-            <a:off x="1143000" y="3602038"/>
-            <a:ext cx="6858000" cy="1655762"/>
+            <a:off x="914400" y="2401359"/>
+            <a:ext cx="5486400" cy="1103841"/>
           </a:xfrm>
         </p:spPr>
         <p:txBody>
@@ -462,39 +678,39 @@
           <a:lstStyle>
             <a:lvl1pPr marL="0" indent="0" algn="ctr">
               <a:buNone/>
-              <a:defRPr sz="2400"/>
+              <a:defRPr sz="1440"/>
             </a:lvl1pPr>
-            <a:lvl2pPr marL="457200" indent="0" algn="ctr">
-              <a:buNone/>
-              <a:defRPr sz="2000"/>
+            <a:lvl2pPr marL="274320" indent="0" algn="ctr">
+              <a:buNone/>
+              <a:defRPr sz="1200"/>
             </a:lvl2pPr>
-            <a:lvl3pPr marL="914400" indent="0" algn="ctr">
-              <a:buNone/>
-              <a:defRPr sz="1800"/>
+            <a:lvl3pPr marL="548640" indent="0" algn="ctr">
+              <a:buNone/>
+              <a:defRPr sz="1080"/>
             </a:lvl3pPr>
-            <a:lvl4pPr marL="1371600" indent="0" algn="ctr">
-              <a:buNone/>
-              <a:defRPr sz="1600"/>
+            <a:lvl4pPr marL="822960" indent="0" algn="ctr">
+              <a:buNone/>
+              <a:defRPr sz="960"/>
             </a:lvl4pPr>
-            <a:lvl5pPr marL="1828800" indent="0" algn="ctr">
-              <a:buNone/>
-              <a:defRPr sz="1600"/>
+            <a:lvl5pPr marL="1097280" indent="0" algn="ctr">
+              <a:buNone/>
+              <a:defRPr sz="960"/>
             </a:lvl5pPr>
-            <a:lvl6pPr marL="2286000" indent="0" algn="ctr">
-              <a:buNone/>
-              <a:defRPr sz="1600"/>
+            <a:lvl6pPr marL="1371600" indent="0" algn="ctr">
+              <a:buNone/>
+              <a:defRPr sz="960"/>
             </a:lvl6pPr>
-            <a:lvl7pPr marL="2743200" indent="0" algn="ctr">
-              <a:buNone/>
-              <a:defRPr sz="1600"/>
+            <a:lvl7pPr marL="1645920" indent="0" algn="ctr">
+              <a:buNone/>
+              <a:defRPr sz="960"/>
             </a:lvl7pPr>
-            <a:lvl8pPr marL="3200400" indent="0" algn="ctr">
-              <a:buNone/>
-              <a:defRPr sz="1600"/>
+            <a:lvl8pPr marL="1920240" indent="0" algn="ctr">
+              <a:buNone/>
+              <a:defRPr sz="960"/>
             </a:lvl8pPr>
-            <a:lvl9pPr marL="3657600" indent="0" algn="ctr">
-              <a:buNone/>
-              <a:defRPr sz="1600"/>
+            <a:lvl9pPr marL="2194560" indent="0" algn="ctr">
+              <a:buNone/>
+              <a:defRPr sz="960"/>
             </a:lvl9pPr>
           </a:lstStyle>
           <a:p>
@@ -523,7 +739,7 @@
           <a:p>
             <a:fld id="{DD53F959-3F16-42CA-9B1E-4CEFAA417EE0}" type="datetimeFigureOut">
               <a:rPr lang="en-US" smtClean="0"/>
-              <a:t>4/23/2018</a:t>
+              <a:t>5/7/2018</a:t>
             </a:fld>
             <a:endParaRPr lang="en-US"/>
           </a:p>
@@ -574,7 +790,7 @@
     </p:spTree>
     <p:extLst>
       <p:ext uri="{BB962C8B-B14F-4D97-AF65-F5344CB8AC3E}">
-        <p14:creationId xmlns:p14="http://schemas.microsoft.com/office/powerpoint/2010/main" val="3594370318"/>
+        <p14:creationId xmlns:p14="http://schemas.microsoft.com/office/powerpoint/2010/main" val="2168614576"/>
       </p:ext>
     </p:extLst>
   </p:cSld>
@@ -693,7 +909,7 @@
           <a:p>
             <a:fld id="{DD53F959-3F16-42CA-9B1E-4CEFAA417EE0}" type="datetimeFigureOut">
               <a:rPr lang="en-US" smtClean="0"/>
-              <a:t>4/23/2018</a:t>
+              <a:t>5/7/2018</a:t>
             </a:fld>
             <a:endParaRPr lang="en-US"/>
           </a:p>
@@ -744,7 +960,7 @@
     </p:spTree>
     <p:extLst>
       <p:ext uri="{BB962C8B-B14F-4D97-AF65-F5344CB8AC3E}">
-        <p14:creationId xmlns:p14="http://schemas.microsoft.com/office/powerpoint/2010/main" val="1536516013"/>
+        <p14:creationId xmlns:p14="http://schemas.microsoft.com/office/powerpoint/2010/main" val="1426324302"/>
       </p:ext>
     </p:extLst>
   </p:cSld>
@@ -783,8 +999,8 @@
         </p:nvSpPr>
         <p:spPr>
           <a:xfrm>
-            <a:off x="6543675" y="365125"/>
-            <a:ext cx="1971675" cy="5811838"/>
+            <a:off x="5234940" y="243417"/>
+            <a:ext cx="1577340" cy="3874559"/>
           </a:xfrm>
         </p:spPr>
         <p:txBody>
@@ -811,8 +1027,8 @@
         </p:nvSpPr>
         <p:spPr>
           <a:xfrm>
-            <a:off x="628650" y="365125"/>
-            <a:ext cx="5800725" cy="5811838"/>
+            <a:off x="502920" y="243417"/>
+            <a:ext cx="4640580" cy="3874559"/>
           </a:xfrm>
         </p:spPr>
         <p:txBody>
@@ -873,7 +1089,7 @@
           <a:p>
             <a:fld id="{DD53F959-3F16-42CA-9B1E-4CEFAA417EE0}" type="datetimeFigureOut">
               <a:rPr lang="en-US" smtClean="0"/>
-              <a:t>4/23/2018</a:t>
+              <a:t>5/7/2018</a:t>
             </a:fld>
             <a:endParaRPr lang="en-US"/>
           </a:p>
@@ -924,7 +1140,7 @@
     </p:spTree>
     <p:extLst>
       <p:ext uri="{BB962C8B-B14F-4D97-AF65-F5344CB8AC3E}">
-        <p14:creationId xmlns:p14="http://schemas.microsoft.com/office/powerpoint/2010/main" val="3863494523"/>
+        <p14:creationId xmlns:p14="http://schemas.microsoft.com/office/powerpoint/2010/main" val="4192532999"/>
       </p:ext>
     </p:extLst>
   </p:cSld>
@@ -1043,7 +1259,7 @@
           <a:p>
             <a:fld id="{DD53F959-3F16-42CA-9B1E-4CEFAA417EE0}" type="datetimeFigureOut">
               <a:rPr lang="en-US" smtClean="0"/>
-              <a:t>4/23/2018</a:t>
+              <a:t>5/7/2018</a:t>
             </a:fld>
             <a:endParaRPr lang="en-US"/>
           </a:p>
@@ -1094,7 +1310,7 @@
     </p:spTree>
     <p:extLst>
       <p:ext uri="{BB962C8B-B14F-4D97-AF65-F5344CB8AC3E}">
-        <p14:creationId xmlns:p14="http://schemas.microsoft.com/office/powerpoint/2010/main" val="2962366245"/>
+        <p14:creationId xmlns:p14="http://schemas.microsoft.com/office/powerpoint/2010/main" val="1729622546"/>
       </p:ext>
     </p:extLst>
   </p:cSld>
@@ -1133,15 +1349,15 @@
         </p:nvSpPr>
         <p:spPr>
           <a:xfrm>
-            <a:off x="623888" y="1709739"/>
-            <a:ext cx="7886700" cy="2852737"/>
+            <a:off x="499110" y="1139826"/>
+            <a:ext cx="6309360" cy="1901825"/>
           </a:xfrm>
         </p:spPr>
         <p:txBody>
           <a:bodyPr anchor="b"/>
           <a:lstStyle>
             <a:lvl1pPr>
-              <a:defRPr sz="6000"/>
+              <a:defRPr sz="3600"/>
             </a:lvl1pPr>
           </a:lstStyle>
           <a:p>
@@ -1165,8 +1381,8 @@
         </p:nvSpPr>
         <p:spPr>
           <a:xfrm>
-            <a:off x="623888" y="4589464"/>
-            <a:ext cx="7886700" cy="1500187"/>
+            <a:off x="499110" y="3059642"/>
+            <a:ext cx="6309360" cy="1000125"/>
           </a:xfrm>
         </p:spPr>
         <p:txBody>
@@ -1174,91 +1390,93 @@
           <a:lstStyle>
             <a:lvl1pPr marL="0" indent="0">
               <a:buNone/>
-              <a:defRPr sz="2400">
-                <a:solidFill>
-                  <a:schemeClr val="tx1"/>
-                </a:solidFill>
-              </a:defRPr>
-            </a:lvl1pPr>
-            <a:lvl2pPr marL="457200" indent="0">
-              <a:buNone/>
-              <a:defRPr sz="2000">
+              <a:defRPr sz="1440">
                 <a:solidFill>
                   <a:schemeClr val="tx1">
                     <a:tint val="75000"/>
                   </a:schemeClr>
                 </a:solidFill>
               </a:defRPr>
-            </a:lvl2pPr>
-            <a:lvl3pPr marL="914400" indent="0">
-              <a:buNone/>
-              <a:defRPr sz="1800">
+            </a:lvl1pPr>
+            <a:lvl2pPr marL="274320" indent="0">
+              <a:buNone/>
+              <a:defRPr sz="1200">
                 <a:solidFill>
                   <a:schemeClr val="tx1">
                     <a:tint val="75000"/>
                   </a:schemeClr>
                 </a:solidFill>
               </a:defRPr>
-            </a:lvl3pPr>
-            <a:lvl4pPr marL="1371600" indent="0">
-              <a:buNone/>
-              <a:defRPr sz="1600">
+            </a:lvl2pPr>
+            <a:lvl3pPr marL="548640" indent="0">
+              <a:buNone/>
+              <a:defRPr sz="1080">
                 <a:solidFill>
                   <a:schemeClr val="tx1">
                     <a:tint val="75000"/>
                   </a:schemeClr>
                 </a:solidFill>
               </a:defRPr>
-            </a:lvl4pPr>
-            <a:lvl5pPr marL="1828800" indent="0">
-              <a:buNone/>
-              <a:defRPr sz="1600">
+            </a:lvl3pPr>
+            <a:lvl4pPr marL="822960" indent="0">
+              <a:buNone/>
+              <a:defRPr sz="960">
                 <a:solidFill>
                   <a:schemeClr val="tx1">
                     <a:tint val="75000"/>
                   </a:schemeClr>
                 </a:solidFill>
               </a:defRPr>
-            </a:lvl5pPr>
-            <a:lvl6pPr marL="2286000" indent="0">
-              <a:buNone/>
-              <a:defRPr sz="1600">
+            </a:lvl4pPr>
+            <a:lvl5pPr marL="1097280" indent="0">
+              <a:buNone/>
+              <a:defRPr sz="960">
                 <a:solidFill>
                   <a:schemeClr val="tx1">
                     <a:tint val="75000"/>
                   </a:schemeClr>
                 </a:solidFill>
               </a:defRPr>
-            </a:lvl6pPr>
-            <a:lvl7pPr marL="2743200" indent="0">
-              <a:buNone/>
-              <a:defRPr sz="1600">
+            </a:lvl5pPr>
+            <a:lvl6pPr marL="1371600" indent="0">
+              <a:buNone/>
+              <a:defRPr sz="960">
                 <a:solidFill>
                   <a:schemeClr val="tx1">
                     <a:tint val="75000"/>
                   </a:schemeClr>
                 </a:solidFill>
               </a:defRPr>
-            </a:lvl7pPr>
-            <a:lvl8pPr marL="3200400" indent="0">
-              <a:buNone/>
-              <a:defRPr sz="1600">
+            </a:lvl6pPr>
+            <a:lvl7pPr marL="1645920" indent="0">
+              <a:buNone/>
+              <a:defRPr sz="960">
                 <a:solidFill>
                   <a:schemeClr val="tx1">
                     <a:tint val="75000"/>
                   </a:schemeClr>
                 </a:solidFill>
               </a:defRPr>
-            </a:lvl8pPr>
-            <a:lvl9pPr marL="3657600" indent="0">
-              <a:buNone/>
-              <a:defRPr sz="1600">
+            </a:lvl7pPr>
+            <a:lvl8pPr marL="1920240" indent="0">
+              <a:buNone/>
+              <a:defRPr sz="960">
                 <a:solidFill>
                   <a:schemeClr val="tx1">
                     <a:tint val="75000"/>
                   </a:schemeClr>
                 </a:solidFill>
               </a:defRPr>
+            </a:lvl8pPr>
+            <a:lvl9pPr marL="2194560" indent="0">
+              <a:buNone/>
+              <a:defRPr sz="960">
+                <a:solidFill>
+                  <a:schemeClr val="tx1">
+                    <a:tint val="75000"/>
+                  </a:schemeClr>
+                </a:solidFill>
+              </a:defRPr>
             </a:lvl9pPr>
           </a:lstStyle>
           <a:p>
@@ -1287,7 +1505,7 @@
           <a:p>
             <a:fld id="{DD53F959-3F16-42CA-9B1E-4CEFAA417EE0}" type="datetimeFigureOut">
               <a:rPr lang="en-US" smtClean="0"/>
-              <a:t>4/23/2018</a:t>
+              <a:t>5/7/2018</a:t>
             </a:fld>
             <a:endParaRPr lang="en-US"/>
           </a:p>
@@ -1338,7 +1556,7 @@
     </p:spTree>
     <p:extLst>
       <p:ext uri="{BB962C8B-B14F-4D97-AF65-F5344CB8AC3E}">
-        <p14:creationId xmlns:p14="http://schemas.microsoft.com/office/powerpoint/2010/main" val="2801578967"/>
+        <p14:creationId xmlns:p14="http://schemas.microsoft.com/office/powerpoint/2010/main" val="2675305004"/>
       </p:ext>
     </p:extLst>
   </p:cSld>
@@ -1400,8 +1618,8 @@
         </p:nvSpPr>
         <p:spPr>
           <a:xfrm>
-            <a:off x="628650" y="1825625"/>
-            <a:ext cx="3886200" cy="4351338"/>
+            <a:off x="502920" y="1217083"/>
+            <a:ext cx="3108960" cy="2900892"/>
           </a:xfrm>
         </p:spPr>
         <p:txBody>
@@ -1457,8 +1675,8 @@
         </p:nvSpPr>
         <p:spPr>
           <a:xfrm>
-            <a:off x="4629150" y="1825625"/>
-            <a:ext cx="3886200" cy="4351338"/>
+            <a:off x="3703320" y="1217083"/>
+            <a:ext cx="3108960" cy="2900892"/>
           </a:xfrm>
         </p:spPr>
         <p:txBody>
@@ -1519,7 +1737,7 @@
           <a:p>
             <a:fld id="{DD53F959-3F16-42CA-9B1E-4CEFAA417EE0}" type="datetimeFigureOut">
               <a:rPr lang="en-US" smtClean="0"/>
-              <a:t>4/23/2018</a:t>
+              <a:t>5/7/2018</a:t>
             </a:fld>
             <a:endParaRPr lang="en-US"/>
           </a:p>
@@ -1570,7 +1788,7 @@
     </p:spTree>
     <p:extLst>
       <p:ext uri="{BB962C8B-B14F-4D97-AF65-F5344CB8AC3E}">
-        <p14:creationId xmlns:p14="http://schemas.microsoft.com/office/powerpoint/2010/main" val="107373305"/>
+        <p14:creationId xmlns:p14="http://schemas.microsoft.com/office/powerpoint/2010/main" val="107694385"/>
       </p:ext>
     </p:extLst>
   </p:cSld>
@@ -1609,8 +1827,8 @@
         </p:nvSpPr>
         <p:spPr>
           <a:xfrm>
-            <a:off x="629841" y="365126"/>
-            <a:ext cx="7886700" cy="1325563"/>
+            <a:off x="503873" y="243417"/>
+            <a:ext cx="6309360" cy="883709"/>
           </a:xfrm>
         </p:spPr>
         <p:txBody>
@@ -1637,8 +1855,8 @@
         </p:nvSpPr>
         <p:spPr>
           <a:xfrm>
-            <a:off x="629842" y="1681163"/>
-            <a:ext cx="3868340" cy="823912"/>
+            <a:off x="503873" y="1120775"/>
+            <a:ext cx="3094672" cy="549275"/>
           </a:xfrm>
         </p:spPr>
         <p:txBody>
@@ -1646,39 +1864,39 @@
           <a:lstStyle>
             <a:lvl1pPr marL="0" indent="0">
               <a:buNone/>
-              <a:defRPr sz="2400" b="1"/>
+              <a:defRPr sz="1440" b="1"/>
             </a:lvl1pPr>
-            <a:lvl2pPr marL="457200" indent="0">
-              <a:buNone/>
-              <a:defRPr sz="2000" b="1"/>
+            <a:lvl2pPr marL="274320" indent="0">
+              <a:buNone/>
+              <a:defRPr sz="1200" b="1"/>
             </a:lvl2pPr>
-            <a:lvl3pPr marL="914400" indent="0">
-              <a:buNone/>
-              <a:defRPr sz="1800" b="1"/>
+            <a:lvl3pPr marL="548640" indent="0">
+              <a:buNone/>
+              <a:defRPr sz="1080" b="1"/>
             </a:lvl3pPr>
-            <a:lvl4pPr marL="1371600" indent="0">
-              <a:buNone/>
-              <a:defRPr sz="1600" b="1"/>
+            <a:lvl4pPr marL="822960" indent="0">
+              <a:buNone/>
+              <a:defRPr sz="960" b="1"/>
             </a:lvl4pPr>
-            <a:lvl5pPr marL="1828800" indent="0">
-              <a:buNone/>
-              <a:defRPr sz="1600" b="1"/>
+            <a:lvl5pPr marL="1097280" indent="0">
+              <a:buNone/>
+              <a:defRPr sz="960" b="1"/>
             </a:lvl5pPr>
-            <a:lvl6pPr marL="2286000" indent="0">
-              <a:buNone/>
-              <a:defRPr sz="1600" b="1"/>
+            <a:lvl6pPr marL="1371600" indent="0">
+              <a:buNone/>
+              <a:defRPr sz="960" b="1"/>
             </a:lvl6pPr>
-            <a:lvl7pPr marL="2743200" indent="0">
-              <a:buNone/>
-              <a:defRPr sz="1600" b="1"/>
+            <a:lvl7pPr marL="1645920" indent="0">
+              <a:buNone/>
+              <a:defRPr sz="960" b="1"/>
             </a:lvl7pPr>
-            <a:lvl8pPr marL="3200400" indent="0">
-              <a:buNone/>
-              <a:defRPr sz="1600" b="1"/>
+            <a:lvl8pPr marL="1920240" indent="0">
+              <a:buNone/>
+              <a:defRPr sz="960" b="1"/>
             </a:lvl8pPr>
-            <a:lvl9pPr marL="3657600" indent="0">
-              <a:buNone/>
-              <a:defRPr sz="1600" b="1"/>
+            <a:lvl9pPr marL="2194560" indent="0">
+              <a:buNone/>
+              <a:defRPr sz="960" b="1"/>
             </a:lvl9pPr>
           </a:lstStyle>
           <a:p>
@@ -1702,8 +1920,8 @@
         </p:nvSpPr>
         <p:spPr>
           <a:xfrm>
-            <a:off x="629842" y="2505075"/>
-            <a:ext cx="3868340" cy="3684588"/>
+            <a:off x="503873" y="1670050"/>
+            <a:ext cx="3094672" cy="2456392"/>
           </a:xfrm>
         </p:spPr>
         <p:txBody>
@@ -1759,8 +1977,8 @@
         </p:nvSpPr>
         <p:spPr>
           <a:xfrm>
-            <a:off x="4629150" y="1681163"/>
-            <a:ext cx="3887391" cy="823912"/>
+            <a:off x="3703320" y="1120775"/>
+            <a:ext cx="3109913" cy="549275"/>
           </a:xfrm>
         </p:spPr>
         <p:txBody>
@@ -1768,39 +1986,39 @@
           <a:lstStyle>
             <a:lvl1pPr marL="0" indent="0">
               <a:buNone/>
-              <a:defRPr sz="2400" b="1"/>
+              <a:defRPr sz="1440" b="1"/>
             </a:lvl1pPr>
-            <a:lvl2pPr marL="457200" indent="0">
-              <a:buNone/>
-              <a:defRPr sz="2000" b="1"/>
+            <a:lvl2pPr marL="274320" indent="0">
+              <a:buNone/>
+              <a:defRPr sz="1200" b="1"/>
             </a:lvl2pPr>
-            <a:lvl3pPr marL="914400" indent="0">
-              <a:buNone/>
-              <a:defRPr sz="1800" b="1"/>
+            <a:lvl3pPr marL="548640" indent="0">
+              <a:buNone/>
+              <a:defRPr sz="1080" b="1"/>
             </a:lvl3pPr>
-            <a:lvl4pPr marL="1371600" indent="0">
-              <a:buNone/>
-              <a:defRPr sz="1600" b="1"/>
+            <a:lvl4pPr marL="822960" indent="0">
+              <a:buNone/>
+              <a:defRPr sz="960" b="1"/>
             </a:lvl4pPr>
-            <a:lvl5pPr marL="1828800" indent="0">
-              <a:buNone/>
-              <a:defRPr sz="1600" b="1"/>
+            <a:lvl5pPr marL="1097280" indent="0">
+              <a:buNone/>
+              <a:defRPr sz="960" b="1"/>
             </a:lvl5pPr>
-            <a:lvl6pPr marL="2286000" indent="0">
-              <a:buNone/>
-              <a:defRPr sz="1600" b="1"/>
+            <a:lvl6pPr marL="1371600" indent="0">
+              <a:buNone/>
+              <a:defRPr sz="960" b="1"/>
             </a:lvl6pPr>
-            <a:lvl7pPr marL="2743200" indent="0">
-              <a:buNone/>
-              <a:defRPr sz="1600" b="1"/>
+            <a:lvl7pPr marL="1645920" indent="0">
+              <a:buNone/>
+              <a:defRPr sz="960" b="1"/>
             </a:lvl7pPr>
-            <a:lvl8pPr marL="3200400" indent="0">
-              <a:buNone/>
-              <a:defRPr sz="1600" b="1"/>
+            <a:lvl8pPr marL="1920240" indent="0">
+              <a:buNone/>
+              <a:defRPr sz="960" b="1"/>
             </a:lvl8pPr>
-            <a:lvl9pPr marL="3657600" indent="0">
-              <a:buNone/>
-              <a:defRPr sz="1600" b="1"/>
+            <a:lvl9pPr marL="2194560" indent="0">
+              <a:buNone/>
+              <a:defRPr sz="960" b="1"/>
             </a:lvl9pPr>
           </a:lstStyle>
           <a:p>
@@ -1824,8 +2042,8 @@
         </p:nvSpPr>
         <p:spPr>
           <a:xfrm>
-            <a:off x="4629150" y="2505075"/>
-            <a:ext cx="3887391" cy="3684588"/>
+            <a:off x="3703320" y="1670050"/>
+            <a:ext cx="3109913" cy="2456392"/>
           </a:xfrm>
         </p:spPr>
         <p:txBody>
@@ -1886,7 +2104,7 @@
           <a:p>
             <a:fld id="{DD53F959-3F16-42CA-9B1E-4CEFAA417EE0}" type="datetimeFigureOut">
               <a:rPr lang="en-US" smtClean="0"/>
-              <a:t>4/23/2018</a:t>
+              <a:t>5/7/2018</a:t>
             </a:fld>
             <a:endParaRPr lang="en-US"/>
           </a:p>
@@ -1937,7 +2155,7 @@
     </p:spTree>
     <p:extLst>
       <p:ext uri="{BB962C8B-B14F-4D97-AF65-F5344CB8AC3E}">
-        <p14:creationId xmlns:p14="http://schemas.microsoft.com/office/powerpoint/2010/main" val="605396882"/>
+        <p14:creationId xmlns:p14="http://schemas.microsoft.com/office/powerpoint/2010/main" val="1749716428"/>
       </p:ext>
     </p:extLst>
   </p:cSld>
@@ -2004,7 +2222,7 @@
           <a:p>
             <a:fld id="{DD53F959-3F16-42CA-9B1E-4CEFAA417EE0}" type="datetimeFigureOut">
               <a:rPr lang="en-US" smtClean="0"/>
-              <a:t>4/23/2018</a:t>
+              <a:t>5/7/2018</a:t>
             </a:fld>
             <a:endParaRPr lang="en-US"/>
           </a:p>
@@ -2055,7 +2273,7 @@
     </p:spTree>
     <p:extLst>
       <p:ext uri="{BB962C8B-B14F-4D97-AF65-F5344CB8AC3E}">
-        <p14:creationId xmlns:p14="http://schemas.microsoft.com/office/powerpoint/2010/main" val="1404366708"/>
+        <p14:creationId xmlns:p14="http://schemas.microsoft.com/office/powerpoint/2010/main" val="2750141485"/>
       </p:ext>
     </p:extLst>
   </p:cSld>
@@ -2099,7 +2317,7 @@
           <a:p>
             <a:fld id="{DD53F959-3F16-42CA-9B1E-4CEFAA417EE0}" type="datetimeFigureOut">
               <a:rPr lang="en-US" smtClean="0"/>
-              <a:t>4/23/2018</a:t>
+              <a:t>5/7/2018</a:t>
             </a:fld>
             <a:endParaRPr lang="en-US"/>
           </a:p>
@@ -2150,7 +2368,7 @@
     </p:spTree>
     <p:extLst>
       <p:ext uri="{BB962C8B-B14F-4D97-AF65-F5344CB8AC3E}">
-        <p14:creationId xmlns:p14="http://schemas.microsoft.com/office/powerpoint/2010/main" val="1467652477"/>
+        <p14:creationId xmlns:p14="http://schemas.microsoft.com/office/powerpoint/2010/main" val="2360930502"/>
       </p:ext>
     </p:extLst>
   </p:cSld>
@@ -2189,15 +2407,15 @@
         </p:nvSpPr>
         <p:spPr>
           <a:xfrm>
-            <a:off x="629841" y="457200"/>
-            <a:ext cx="2949178" cy="1600200"/>
+            <a:off x="503873" y="304800"/>
+            <a:ext cx="2359342" cy="1066800"/>
           </a:xfrm>
         </p:spPr>
         <p:txBody>
           <a:bodyPr anchor="b"/>
           <a:lstStyle>
             <a:lvl1pPr>
-              <a:defRPr sz="3200"/>
+              <a:defRPr sz="1920"/>
             </a:lvl1pPr>
           </a:lstStyle>
           <a:p>
@@ -2221,39 +2439,39 @@
         </p:nvSpPr>
         <p:spPr>
           <a:xfrm>
-            <a:off x="3887391" y="987426"/>
-            <a:ext cx="4629150" cy="4873625"/>
+            <a:off x="3109913" y="658284"/>
+            <a:ext cx="3703320" cy="3249083"/>
           </a:xfrm>
         </p:spPr>
         <p:txBody>
           <a:bodyPr/>
           <a:lstStyle>
             <a:lvl1pPr>
-              <a:defRPr sz="3200"/>
+              <a:defRPr sz="1920"/>
             </a:lvl1pPr>
             <a:lvl2pPr>
-              <a:defRPr sz="2800"/>
+              <a:defRPr sz="1680"/>
             </a:lvl2pPr>
             <a:lvl3pPr>
-              <a:defRPr sz="2400"/>
+              <a:defRPr sz="1440"/>
             </a:lvl3pPr>
             <a:lvl4pPr>
-              <a:defRPr sz="2000"/>
+              <a:defRPr sz="1200"/>
             </a:lvl4pPr>
             <a:lvl5pPr>
-              <a:defRPr sz="2000"/>
+              <a:defRPr sz="1200"/>
             </a:lvl5pPr>
             <a:lvl6pPr>
-              <a:defRPr sz="2000"/>
+              <a:defRPr sz="1200"/>
             </a:lvl6pPr>
             <a:lvl7pPr>
-              <a:defRPr sz="2000"/>
+              <a:defRPr sz="1200"/>
             </a:lvl7pPr>
             <a:lvl8pPr>
-              <a:defRPr sz="2000"/>
+              <a:defRPr sz="1200"/>
             </a:lvl8pPr>
             <a:lvl9pPr>
-              <a:defRPr sz="2000"/>
+              <a:defRPr sz="1200"/>
             </a:lvl9pPr>
           </a:lstStyle>
           <a:p>
@@ -2306,8 +2524,8 @@
         </p:nvSpPr>
         <p:spPr>
           <a:xfrm>
-            <a:off x="629841" y="2057400"/>
-            <a:ext cx="2949178" cy="3811588"/>
+            <a:off x="503873" y="1371600"/>
+            <a:ext cx="2359342" cy="2541059"/>
           </a:xfrm>
         </p:spPr>
         <p:txBody>
@@ -2315,39 +2533,39 @@
           <a:lstStyle>
             <a:lvl1pPr marL="0" indent="0">
               <a:buNone/>
-              <a:defRPr sz="1600"/>
+              <a:defRPr sz="960"/>
             </a:lvl1pPr>
-            <a:lvl2pPr marL="457200" indent="0">
-              <a:buNone/>
-              <a:defRPr sz="1400"/>
+            <a:lvl2pPr marL="274320" indent="0">
+              <a:buNone/>
+              <a:defRPr sz="840"/>
             </a:lvl2pPr>
-            <a:lvl3pPr marL="914400" indent="0">
-              <a:buNone/>
-              <a:defRPr sz="1200"/>
+            <a:lvl3pPr marL="548640" indent="0">
+              <a:buNone/>
+              <a:defRPr sz="720"/>
             </a:lvl3pPr>
-            <a:lvl4pPr marL="1371600" indent="0">
-              <a:buNone/>
-              <a:defRPr sz="1000"/>
+            <a:lvl4pPr marL="822960" indent="0">
+              <a:buNone/>
+              <a:defRPr sz="600"/>
             </a:lvl4pPr>
-            <a:lvl5pPr marL="1828800" indent="0">
-              <a:buNone/>
-              <a:defRPr sz="1000"/>
+            <a:lvl5pPr marL="1097280" indent="0">
+              <a:buNone/>
+              <a:defRPr sz="600"/>
             </a:lvl5pPr>
-            <a:lvl6pPr marL="2286000" indent="0">
-              <a:buNone/>
-              <a:defRPr sz="1000"/>
+            <a:lvl6pPr marL="1371600" indent="0">
+              <a:buNone/>
+              <a:defRPr sz="600"/>
             </a:lvl6pPr>
-            <a:lvl7pPr marL="2743200" indent="0">
-              <a:buNone/>
-              <a:defRPr sz="1000"/>
+            <a:lvl7pPr marL="1645920" indent="0">
+              <a:buNone/>
+              <a:defRPr sz="600"/>
             </a:lvl7pPr>
-            <a:lvl8pPr marL="3200400" indent="0">
-              <a:buNone/>
-              <a:defRPr sz="1000"/>
+            <a:lvl8pPr marL="1920240" indent="0">
+              <a:buNone/>
+              <a:defRPr sz="600"/>
             </a:lvl8pPr>
-            <a:lvl9pPr marL="3657600" indent="0">
-              <a:buNone/>
-              <a:defRPr sz="1000"/>
+            <a:lvl9pPr marL="2194560" indent="0">
+              <a:buNone/>
+              <a:defRPr sz="600"/>
             </a:lvl9pPr>
           </a:lstStyle>
           <a:p>
@@ -2376,7 +2594,7 @@
           <a:p>
             <a:fld id="{DD53F959-3F16-42CA-9B1E-4CEFAA417EE0}" type="datetimeFigureOut">
               <a:rPr lang="en-US" smtClean="0"/>
-              <a:t>4/23/2018</a:t>
+              <a:t>5/7/2018</a:t>
             </a:fld>
             <a:endParaRPr lang="en-US"/>
           </a:p>
@@ -2427,7 +2645,7 @@
     </p:spTree>
     <p:extLst>
       <p:ext uri="{BB962C8B-B14F-4D97-AF65-F5344CB8AC3E}">
-        <p14:creationId xmlns:p14="http://schemas.microsoft.com/office/powerpoint/2010/main" val="2902235662"/>
+        <p14:creationId xmlns:p14="http://schemas.microsoft.com/office/powerpoint/2010/main" val="907310172"/>
       </p:ext>
     </p:extLst>
   </p:cSld>
@@ -2466,15 +2684,15 @@
         </p:nvSpPr>
         <p:spPr>
           <a:xfrm>
-            <a:off x="629841" y="457200"/>
-            <a:ext cx="2949178" cy="1600200"/>
+            <a:off x="503873" y="304800"/>
+            <a:ext cx="2359342" cy="1066800"/>
           </a:xfrm>
         </p:spPr>
         <p:txBody>
           <a:bodyPr anchor="b"/>
           <a:lstStyle>
             <a:lvl1pPr>
-              <a:defRPr sz="3200"/>
+              <a:defRPr sz="1920"/>
             </a:lvl1pPr>
           </a:lstStyle>
           <a:p>
@@ -2498,8 +2716,8 @@
         </p:nvSpPr>
         <p:spPr>
           <a:xfrm>
-            <a:off x="3887391" y="987426"/>
-            <a:ext cx="4629150" cy="4873625"/>
+            <a:off x="3109913" y="658284"/>
+            <a:ext cx="3703320" cy="3249083"/>
           </a:xfrm>
         </p:spPr>
         <p:txBody>
@@ -2507,39 +2725,39 @@
           <a:lstStyle>
             <a:lvl1pPr marL="0" indent="0">
               <a:buNone/>
-              <a:defRPr sz="3200"/>
+              <a:defRPr sz="1920"/>
             </a:lvl1pPr>
-            <a:lvl2pPr marL="457200" indent="0">
-              <a:buNone/>
-              <a:defRPr sz="2800"/>
+            <a:lvl2pPr marL="274320" indent="0">
+              <a:buNone/>
+              <a:defRPr sz="1680"/>
             </a:lvl2pPr>
-            <a:lvl3pPr marL="914400" indent="0">
-              <a:buNone/>
-              <a:defRPr sz="2400"/>
+            <a:lvl3pPr marL="548640" indent="0">
+              <a:buNone/>
+              <a:defRPr sz="1440"/>
             </a:lvl3pPr>
-            <a:lvl4pPr marL="1371600" indent="0">
-              <a:buNone/>
-              <a:defRPr sz="2000"/>
+            <a:lvl4pPr marL="822960" indent="0">
+              <a:buNone/>
+              <a:defRPr sz="1200"/>
             </a:lvl4pPr>
-            <a:lvl5pPr marL="1828800" indent="0">
-              <a:buNone/>
-              <a:defRPr sz="2000"/>
+            <a:lvl5pPr marL="1097280" indent="0">
+              <a:buNone/>
+              <a:defRPr sz="1200"/>
             </a:lvl5pPr>
-            <a:lvl6pPr marL="2286000" indent="0">
-              <a:buNone/>
-              <a:defRPr sz="2000"/>
+            <a:lvl6pPr marL="1371600" indent="0">
+              <a:buNone/>
+              <a:defRPr sz="1200"/>
             </a:lvl6pPr>
-            <a:lvl7pPr marL="2743200" indent="0">
-              <a:buNone/>
-              <a:defRPr sz="2000"/>
+            <a:lvl7pPr marL="1645920" indent="0">
+              <a:buNone/>
+              <a:defRPr sz="1200"/>
             </a:lvl7pPr>
-            <a:lvl8pPr marL="3200400" indent="0">
-              <a:buNone/>
-              <a:defRPr sz="2000"/>
+            <a:lvl8pPr marL="1920240" indent="0">
+              <a:buNone/>
+              <a:defRPr sz="1200"/>
             </a:lvl8pPr>
-            <a:lvl9pPr marL="3657600" indent="0">
-              <a:buNone/>
-              <a:defRPr sz="2000"/>
+            <a:lvl9pPr marL="2194560" indent="0">
+              <a:buNone/>
+              <a:defRPr sz="1200"/>
             </a:lvl9pPr>
           </a:lstStyle>
           <a:p>
@@ -2563,8 +2781,8 @@
         </p:nvSpPr>
         <p:spPr>
           <a:xfrm>
-            <a:off x="629841" y="2057400"/>
-            <a:ext cx="2949178" cy="3811588"/>
+            <a:off x="503873" y="1371600"/>
+            <a:ext cx="2359342" cy="2541059"/>
           </a:xfrm>
         </p:spPr>
         <p:txBody>
@@ -2572,39 +2790,39 @@
           <a:lstStyle>
             <a:lvl1pPr marL="0" indent="0">
               <a:buNone/>
-              <a:defRPr sz="1600"/>
+              <a:defRPr sz="960"/>
             </a:lvl1pPr>
-            <a:lvl2pPr marL="457200" indent="0">
-              <a:buNone/>
-              <a:defRPr sz="1400"/>
+            <a:lvl2pPr marL="274320" indent="0">
+              <a:buNone/>
+              <a:defRPr sz="840"/>
             </a:lvl2pPr>
-            <a:lvl3pPr marL="914400" indent="0">
-              <a:buNone/>
-              <a:defRPr sz="1200"/>
+            <a:lvl3pPr marL="548640" indent="0">
+              <a:buNone/>
+              <a:defRPr sz="720"/>
             </a:lvl3pPr>
-            <a:lvl4pPr marL="1371600" indent="0">
-              <a:buNone/>
-              <a:defRPr sz="1000"/>
+            <a:lvl4pPr marL="822960" indent="0">
+              <a:buNone/>
+              <a:defRPr sz="600"/>
             </a:lvl4pPr>
-            <a:lvl5pPr marL="1828800" indent="0">
-              <a:buNone/>
-              <a:defRPr sz="1000"/>
+            <a:lvl5pPr marL="1097280" indent="0">
+              <a:buNone/>
+              <a:defRPr sz="600"/>
             </a:lvl5pPr>
-            <a:lvl6pPr marL="2286000" indent="0">
-              <a:buNone/>
-              <a:defRPr sz="1000"/>
+            <a:lvl6pPr marL="1371600" indent="0">
+              <a:buNone/>
+              <a:defRPr sz="600"/>
             </a:lvl6pPr>
-            <a:lvl7pPr marL="2743200" indent="0">
-              <a:buNone/>
-              <a:defRPr sz="1000"/>
+            <a:lvl7pPr marL="1645920" indent="0">
+              <a:buNone/>
+              <a:defRPr sz="600"/>
             </a:lvl7pPr>
-            <a:lvl8pPr marL="3200400" indent="0">
-              <a:buNone/>
-              <a:defRPr sz="1000"/>
+            <a:lvl8pPr marL="1920240" indent="0">
+              <a:buNone/>
+              <a:defRPr sz="600"/>
             </a:lvl8pPr>
-            <a:lvl9pPr marL="3657600" indent="0">
-              <a:buNone/>
-              <a:defRPr sz="1000"/>
+            <a:lvl9pPr marL="2194560" indent="0">
+              <a:buNone/>
+              <a:defRPr sz="600"/>
             </a:lvl9pPr>
           </a:lstStyle>
           <a:p>
@@ -2633,7 +2851,7 @@
           <a:p>
             <a:fld id="{DD53F959-3F16-42CA-9B1E-4CEFAA417EE0}" type="datetimeFigureOut">
               <a:rPr lang="en-US" smtClean="0"/>
-              <a:t>4/23/2018</a:t>
+              <a:t>5/7/2018</a:t>
             </a:fld>
             <a:endParaRPr lang="en-US"/>
           </a:p>
@@ -2684,7 +2902,7 @@
     </p:spTree>
     <p:extLst>
       <p:ext uri="{BB962C8B-B14F-4D97-AF65-F5344CB8AC3E}">
-        <p14:creationId xmlns:p14="http://schemas.microsoft.com/office/powerpoint/2010/main" val="1965053205"/>
+        <p14:creationId xmlns:p14="http://schemas.microsoft.com/office/powerpoint/2010/main" val="2943879890"/>
       </p:ext>
     </p:extLst>
   </p:cSld>
@@ -2728,8 +2946,8 @@
         </p:nvSpPr>
         <p:spPr>
           <a:xfrm>
-            <a:off x="628650" y="365126"/>
-            <a:ext cx="7886700" cy="1325563"/>
+            <a:off x="502920" y="243417"/>
+            <a:ext cx="6309360" cy="883709"/>
           </a:xfrm>
           <a:prstGeom prst="rect">
             <a:avLst/>
@@ -2761,8 +2979,8 @@
         </p:nvSpPr>
         <p:spPr>
           <a:xfrm>
-            <a:off x="628650" y="1825625"/>
-            <a:ext cx="7886700" cy="4351338"/>
+            <a:off x="502920" y="1217083"/>
+            <a:ext cx="6309360" cy="2900892"/>
           </a:xfrm>
           <a:prstGeom prst="rect">
             <a:avLst/>
@@ -2823,8 +3041,8 @@
         </p:nvSpPr>
         <p:spPr>
           <a:xfrm>
-            <a:off x="628650" y="6356351"/>
-            <a:ext cx="2057400" cy="365125"/>
+            <a:off x="502920" y="4237567"/>
+            <a:ext cx="1645920" cy="243417"/>
           </a:xfrm>
           <a:prstGeom prst="rect">
             <a:avLst/>
@@ -2834,7 +3052,7 @@
           <a:bodyPr vert="horz" lIns="91440" tIns="45720" rIns="91440" bIns="45720" rtlCol="0" anchor="ctr"/>
           <a:lstStyle>
             <a:lvl1pPr algn="l">
-              <a:defRPr sz="1200">
+              <a:defRPr sz="720">
                 <a:solidFill>
                   <a:schemeClr val="tx1">
                     <a:tint val="75000"/>
@@ -2846,7 +3064,7 @@
           <a:p>
             <a:fld id="{DD53F959-3F16-42CA-9B1E-4CEFAA417EE0}" type="datetimeFigureOut">
               <a:rPr lang="en-US" smtClean="0"/>
-              <a:t>4/23/2018</a:t>
+              <a:t>5/7/2018</a:t>
             </a:fld>
             <a:endParaRPr lang="en-US"/>
           </a:p>
@@ -2864,8 +3082,8 @@
         </p:nvSpPr>
         <p:spPr>
           <a:xfrm>
-            <a:off x="3028950" y="6356351"/>
-            <a:ext cx="3086100" cy="365125"/>
+            <a:off x="2423160" y="4237567"/>
+            <a:ext cx="2468880" cy="243417"/>
           </a:xfrm>
           <a:prstGeom prst="rect">
             <a:avLst/>
@@ -2875,7 +3093,7 @@
           <a:bodyPr vert="horz" lIns="91440" tIns="45720" rIns="91440" bIns="45720" rtlCol="0" anchor="ctr"/>
           <a:lstStyle>
             <a:lvl1pPr algn="ctr">
-              <a:defRPr sz="1200">
+              <a:defRPr sz="720">
                 <a:solidFill>
                   <a:schemeClr val="tx1">
                     <a:tint val="75000"/>
@@ -2901,8 +3119,8 @@
         </p:nvSpPr>
         <p:spPr>
           <a:xfrm>
-            <a:off x="6457950" y="6356351"/>
-            <a:ext cx="2057400" cy="365125"/>
+            <a:off x="5166360" y="4237567"/>
+            <a:ext cx="1645920" cy="243417"/>
           </a:xfrm>
           <a:prstGeom prst="rect">
             <a:avLst/>
@@ -2912,7 +3130,7 @@
           <a:bodyPr vert="horz" lIns="91440" tIns="45720" rIns="91440" bIns="45720" rtlCol="0" anchor="ctr"/>
           <a:lstStyle>
             <a:lvl1pPr algn="r">
-              <a:defRPr sz="1200">
+              <a:defRPr sz="720">
                 <a:solidFill>
                   <a:schemeClr val="tx1">
                     <a:tint val="75000"/>
@@ -2933,27 +3151,27 @@
     </p:spTree>
     <p:extLst>
       <p:ext uri="{BB962C8B-B14F-4D97-AF65-F5344CB8AC3E}">
-        <p14:creationId xmlns:p14="http://schemas.microsoft.com/office/powerpoint/2010/main" val="568517320"/>
+        <p14:creationId xmlns:p14="http://schemas.microsoft.com/office/powerpoint/2010/main" val="3906106380"/>
       </p:ext>
     </p:extLst>
   </p:cSld>
   <p:clrMap bg1="lt1" tx1="dk1" bg2="lt2" tx2="dk2" accent1="accent1" accent2="accent2" accent3="accent3" accent4="accent4" accent5="accent5" accent6="accent6" hlink="hlink" folHlink="folHlink"/>
   <p:sldLayoutIdLst>
-    <p:sldLayoutId id="2147483661" r:id="rId1"/>
-    <p:sldLayoutId id="2147483662" r:id="rId2"/>
-    <p:sldLayoutId id="2147483663" r:id="rId3"/>
-    <p:sldLayoutId id="2147483664" r:id="rId4"/>
-    <p:sldLayoutId id="2147483665" r:id="rId5"/>
-    <p:sldLayoutId id="2147483666" r:id="rId6"/>
-    <p:sldLayoutId id="2147483667" r:id="rId7"/>
-    <p:sldLayoutId id="2147483668" r:id="rId8"/>
-    <p:sldLayoutId id="2147483669" r:id="rId9"/>
-    <p:sldLayoutId id="2147483670" r:id="rId10"/>
-    <p:sldLayoutId id="2147483671" r:id="rId11"/>
+    <p:sldLayoutId id="2147483685" r:id="rId1"/>
+    <p:sldLayoutId id="2147483686" r:id="rId2"/>
+    <p:sldLayoutId id="2147483687" r:id="rId3"/>
+    <p:sldLayoutId id="2147483688" r:id="rId4"/>
+    <p:sldLayoutId id="2147483689" r:id="rId5"/>
+    <p:sldLayoutId id="2147483690" r:id="rId6"/>
+    <p:sldLayoutId id="2147483691" r:id="rId7"/>
+    <p:sldLayoutId id="2147483692" r:id="rId8"/>
+    <p:sldLayoutId id="2147483693" r:id="rId9"/>
+    <p:sldLayoutId id="2147483694" r:id="rId10"/>
+    <p:sldLayoutId id="2147483695" r:id="rId11"/>
   </p:sldLayoutIdLst>
   <p:txStyles>
     <p:titleStyle>
-      <a:lvl1pPr algn="l" defTabSz="914400" rtl="0" eaLnBrk="1" latinLnBrk="0" hangingPunct="1">
+      <a:lvl1pPr algn="l" defTabSz="548640" rtl="0" eaLnBrk="1" latinLnBrk="0" hangingPunct="1">
         <a:lnSpc>
           <a:spcPct val="90000"/>
         </a:lnSpc>
@@ -2961,7 +3179,7 @@
           <a:spcPct val="0"/>
         </a:spcBef>
         <a:buNone/>
-        <a:defRPr sz="4400" kern="1200">
+        <a:defRPr sz="2640" kern="1200">
           <a:solidFill>
             <a:schemeClr val="tx1"/>
           </a:solidFill>
@@ -2972,16 +3190,16 @@
       </a:lvl1pPr>
     </p:titleStyle>
     <p:bodyStyle>
-      <a:lvl1pPr marL="228600" indent="-228600" algn="l" defTabSz="914400" rtl="0" eaLnBrk="1" latinLnBrk="0" hangingPunct="1">
+      <a:lvl1pPr marL="137160" indent="-137160" algn="l" defTabSz="548640" rtl="0" eaLnBrk="1" latinLnBrk="0" hangingPunct="1">
         <a:lnSpc>
           <a:spcPct val="90000"/>
         </a:lnSpc>
         <a:spcBef>
-          <a:spcPts val="1000"/>
+          <a:spcPts val="600"/>
         </a:spcBef>
         <a:buFont typeface="Arial" panose="020B0604020202020204" pitchFamily="34" charset="0"/>
         <a:buChar char="•"/>
-        <a:defRPr sz="2800" kern="1200">
+        <a:defRPr sz="1680" kern="1200">
           <a:solidFill>
             <a:schemeClr val="tx1"/>
           </a:solidFill>
@@ -2990,16 +3208,16 @@
           <a:cs typeface="+mn-cs"/>
         </a:defRPr>
       </a:lvl1pPr>
-      <a:lvl2pPr marL="685800" indent="-228600" algn="l" defTabSz="914400" rtl="0" eaLnBrk="1" latinLnBrk="0" hangingPunct="1">
+      <a:lvl2pPr marL="411480" indent="-137160" algn="l" defTabSz="548640" rtl="0" eaLnBrk="1" latinLnBrk="0" hangingPunct="1">
         <a:lnSpc>
           <a:spcPct val="90000"/>
         </a:lnSpc>
         <a:spcBef>
-          <a:spcPts val="500"/>
+          <a:spcPts val="300"/>
         </a:spcBef>
         <a:buFont typeface="Arial" panose="020B0604020202020204" pitchFamily="34" charset="0"/>
         <a:buChar char="•"/>
-        <a:defRPr sz="2400" kern="1200">
+        <a:defRPr sz="1440" kern="1200">
           <a:solidFill>
             <a:schemeClr val="tx1"/>
           </a:solidFill>
@@ -3008,16 +3226,16 @@
           <a:cs typeface="+mn-cs"/>
         </a:defRPr>
       </a:lvl2pPr>
-      <a:lvl3pPr marL="1143000" indent="-228600" algn="l" defTabSz="914400" rtl="0" eaLnBrk="1" latinLnBrk="0" hangingPunct="1">
+      <a:lvl3pPr marL="685800" indent="-137160" algn="l" defTabSz="548640" rtl="0" eaLnBrk="1" latinLnBrk="0" hangingPunct="1">
         <a:lnSpc>
           <a:spcPct val="90000"/>
         </a:lnSpc>
         <a:spcBef>
-          <a:spcPts val="500"/>
+          <a:spcPts val="300"/>
         </a:spcBef>
         <a:buFont typeface="Arial" panose="020B0604020202020204" pitchFamily="34" charset="0"/>
         <a:buChar char="•"/>
-        <a:defRPr sz="2000" kern="1200">
+        <a:defRPr sz="1200" kern="1200">
           <a:solidFill>
             <a:schemeClr val="tx1"/>
           </a:solidFill>
@@ -3026,16 +3244,16 @@
           <a:cs typeface="+mn-cs"/>
         </a:defRPr>
       </a:lvl3pPr>
-      <a:lvl4pPr marL="1600200" indent="-228600" algn="l" defTabSz="914400" rtl="0" eaLnBrk="1" latinLnBrk="0" hangingPunct="1">
+      <a:lvl4pPr marL="960120" indent="-137160" algn="l" defTabSz="548640" rtl="0" eaLnBrk="1" latinLnBrk="0" hangingPunct="1">
         <a:lnSpc>
           <a:spcPct val="90000"/>
         </a:lnSpc>
         <a:spcBef>
-          <a:spcPts val="500"/>
+          <a:spcPts val="300"/>
         </a:spcBef>
         <a:buFont typeface="Arial" panose="020B0604020202020204" pitchFamily="34" charset="0"/>
         <a:buChar char="•"/>
-        <a:defRPr sz="1800" kern="1200">
+        <a:defRPr sz="1080" kern="1200">
           <a:solidFill>
             <a:schemeClr val="tx1"/>
           </a:solidFill>
@@ -3044,16 +3262,16 @@
           <a:cs typeface="+mn-cs"/>
         </a:defRPr>
       </a:lvl4pPr>
-      <a:lvl5pPr marL="2057400" indent="-228600" algn="l" defTabSz="914400" rtl="0" eaLnBrk="1" latinLnBrk="0" hangingPunct="1">
+      <a:lvl5pPr marL="1234440" indent="-137160" algn="l" defTabSz="548640" rtl="0" eaLnBrk="1" latinLnBrk="0" hangingPunct="1">
         <a:lnSpc>
           <a:spcPct val="90000"/>
         </a:lnSpc>
         <a:spcBef>
-          <a:spcPts val="500"/>
+          <a:spcPts val="300"/>
         </a:spcBef>
         <a:buFont typeface="Arial" panose="020B0604020202020204" pitchFamily="34" charset="0"/>
         <a:buChar char="•"/>
-        <a:defRPr sz="1800" kern="1200">
+        <a:defRPr sz="1080" kern="1200">
           <a:solidFill>
             <a:schemeClr val="tx1"/>
           </a:solidFill>
@@ -3062,16 +3280,16 @@
           <a:cs typeface="+mn-cs"/>
         </a:defRPr>
       </a:lvl5pPr>
-      <a:lvl6pPr marL="2514600" indent="-228600" algn="l" defTabSz="914400" rtl="0" eaLnBrk="1" latinLnBrk="0" hangingPunct="1">
+      <a:lvl6pPr marL="1508760" indent="-137160" algn="l" defTabSz="548640" rtl="0" eaLnBrk="1" latinLnBrk="0" hangingPunct="1">
         <a:lnSpc>
           <a:spcPct val="90000"/>
         </a:lnSpc>
         <a:spcBef>
-          <a:spcPts val="500"/>
+          <a:spcPts val="300"/>
         </a:spcBef>
         <a:buFont typeface="Arial" panose="020B0604020202020204" pitchFamily="34" charset="0"/>
         <a:buChar char="•"/>
-        <a:defRPr sz="1800" kern="1200">
+        <a:defRPr sz="1080" kern="1200">
           <a:solidFill>
             <a:schemeClr val="tx1"/>
           </a:solidFill>
@@ -3080,16 +3298,16 @@
           <a:cs typeface="+mn-cs"/>
         </a:defRPr>
       </a:lvl6pPr>
-      <a:lvl7pPr marL="2971800" indent="-228600" algn="l" defTabSz="914400" rtl="0" eaLnBrk="1" latinLnBrk="0" hangingPunct="1">
+      <a:lvl7pPr marL="1783080" indent="-137160" algn="l" defTabSz="548640" rtl="0" eaLnBrk="1" latinLnBrk="0" hangingPunct="1">
         <a:lnSpc>
           <a:spcPct val="90000"/>
         </a:lnSpc>
         <a:spcBef>
-          <a:spcPts val="500"/>
+          <a:spcPts val="300"/>
         </a:spcBef>
         <a:buFont typeface="Arial" panose="020B0604020202020204" pitchFamily="34" charset="0"/>
         <a:buChar char="•"/>
-        <a:defRPr sz="1800" kern="1200">
+        <a:defRPr sz="1080" kern="1200">
           <a:solidFill>
             <a:schemeClr val="tx1"/>
           </a:solidFill>
@@ -3098,16 +3316,16 @@
           <a:cs typeface="+mn-cs"/>
         </a:defRPr>
       </a:lvl7pPr>
-      <a:lvl8pPr marL="3429000" indent="-228600" algn="l" defTabSz="914400" rtl="0" eaLnBrk="1" latinLnBrk="0" hangingPunct="1">
+      <a:lvl8pPr marL="2057400" indent="-137160" algn="l" defTabSz="548640" rtl="0" eaLnBrk="1" latinLnBrk="0" hangingPunct="1">
         <a:lnSpc>
           <a:spcPct val="90000"/>
         </a:lnSpc>
         <a:spcBef>
-          <a:spcPts val="500"/>
+          <a:spcPts val="300"/>
         </a:spcBef>
         <a:buFont typeface="Arial" panose="020B0604020202020204" pitchFamily="34" charset="0"/>
         <a:buChar char="•"/>
-        <a:defRPr sz="1800" kern="1200">
+        <a:defRPr sz="1080" kern="1200">
           <a:solidFill>
             <a:schemeClr val="tx1"/>
           </a:solidFill>
@@ -3116,16 +3334,16 @@
           <a:cs typeface="+mn-cs"/>
         </a:defRPr>
       </a:lvl8pPr>
-      <a:lvl9pPr marL="3886200" indent="-228600" algn="l" defTabSz="914400" rtl="0" eaLnBrk="1" latinLnBrk="0" hangingPunct="1">
+      <a:lvl9pPr marL="2331720" indent="-137160" algn="l" defTabSz="548640" rtl="0" eaLnBrk="1" latinLnBrk="0" hangingPunct="1">
         <a:lnSpc>
           <a:spcPct val="90000"/>
         </a:lnSpc>
         <a:spcBef>
-          <a:spcPts val="500"/>
+          <a:spcPts val="300"/>
         </a:spcBef>
         <a:buFont typeface="Arial" panose="020B0604020202020204" pitchFamily="34" charset="0"/>
         <a:buChar char="•"/>
-        <a:defRPr sz="1800" kern="1200">
+        <a:defRPr sz="1080" kern="1200">
           <a:solidFill>
             <a:schemeClr val="tx1"/>
           </a:solidFill>
@@ -3139,8 +3357,8 @@
       <a:defPPr>
         <a:defRPr lang="en-US"/>
       </a:defPPr>
-      <a:lvl1pPr marL="0" algn="l" defTabSz="914400" rtl="0" eaLnBrk="1" latinLnBrk="0" hangingPunct="1">
-        <a:defRPr sz="1800" kern="1200">
+      <a:lvl1pPr marL="0" algn="l" defTabSz="548640" rtl="0" eaLnBrk="1" latinLnBrk="0" hangingPunct="1">
+        <a:defRPr sz="1080" kern="1200">
           <a:solidFill>
             <a:schemeClr val="tx1"/>
           </a:solidFill>
@@ -3149,8 +3367,8 @@
           <a:cs typeface="+mn-cs"/>
         </a:defRPr>
       </a:lvl1pPr>
-      <a:lvl2pPr marL="457200" algn="l" defTabSz="914400" rtl="0" eaLnBrk="1" latinLnBrk="0" hangingPunct="1">
-        <a:defRPr sz="1800" kern="1200">
+      <a:lvl2pPr marL="274320" algn="l" defTabSz="548640" rtl="0" eaLnBrk="1" latinLnBrk="0" hangingPunct="1">
+        <a:defRPr sz="1080" kern="1200">
           <a:solidFill>
             <a:schemeClr val="tx1"/>
           </a:solidFill>
@@ -3159,8 +3377,8 @@
           <a:cs typeface="+mn-cs"/>
         </a:defRPr>
       </a:lvl2pPr>
-      <a:lvl3pPr marL="914400" algn="l" defTabSz="914400" rtl="0" eaLnBrk="1" latinLnBrk="0" hangingPunct="1">
-        <a:defRPr sz="1800" kern="1200">
+      <a:lvl3pPr marL="548640" algn="l" defTabSz="548640" rtl="0" eaLnBrk="1" latinLnBrk="0" hangingPunct="1">
+        <a:defRPr sz="1080" kern="1200">
           <a:solidFill>
             <a:schemeClr val="tx1"/>
           </a:solidFill>
@@ -3169,8 +3387,8 @@
           <a:cs typeface="+mn-cs"/>
         </a:defRPr>
       </a:lvl3pPr>
-      <a:lvl4pPr marL="1371600" algn="l" defTabSz="914400" rtl="0" eaLnBrk="1" latinLnBrk="0" hangingPunct="1">
-        <a:defRPr sz="1800" kern="1200">
+      <a:lvl4pPr marL="822960" algn="l" defTabSz="548640" rtl="0" eaLnBrk="1" latinLnBrk="0" hangingPunct="1">
+        <a:defRPr sz="1080" kern="1200">
           <a:solidFill>
             <a:schemeClr val="tx1"/>
           </a:solidFill>
@@ -3179,8 +3397,8 @@
           <a:cs typeface="+mn-cs"/>
         </a:defRPr>
       </a:lvl4pPr>
-      <a:lvl5pPr marL="1828800" algn="l" defTabSz="914400" rtl="0" eaLnBrk="1" latinLnBrk="0" hangingPunct="1">
-        <a:defRPr sz="1800" kern="1200">
+      <a:lvl5pPr marL="1097280" algn="l" defTabSz="548640" rtl="0" eaLnBrk="1" latinLnBrk="0" hangingPunct="1">
+        <a:defRPr sz="1080" kern="1200">
           <a:solidFill>
             <a:schemeClr val="tx1"/>
           </a:solidFill>
@@ -3189,8 +3407,8 @@
           <a:cs typeface="+mn-cs"/>
         </a:defRPr>
       </a:lvl5pPr>
-      <a:lvl6pPr marL="2286000" algn="l" defTabSz="914400" rtl="0" eaLnBrk="1" latinLnBrk="0" hangingPunct="1">
-        <a:defRPr sz="1800" kern="1200">
+      <a:lvl6pPr marL="1371600" algn="l" defTabSz="548640" rtl="0" eaLnBrk="1" latinLnBrk="0" hangingPunct="1">
+        <a:defRPr sz="1080" kern="1200">
           <a:solidFill>
             <a:schemeClr val="tx1"/>
           </a:solidFill>
@@ -3199,8 +3417,8 @@
           <a:cs typeface="+mn-cs"/>
         </a:defRPr>
       </a:lvl6pPr>
-      <a:lvl7pPr marL="2743200" algn="l" defTabSz="914400" rtl="0" eaLnBrk="1" latinLnBrk="0" hangingPunct="1">
-        <a:defRPr sz="1800" kern="1200">
+      <a:lvl7pPr marL="1645920" algn="l" defTabSz="548640" rtl="0" eaLnBrk="1" latinLnBrk="0" hangingPunct="1">
+        <a:defRPr sz="1080" kern="1200">
           <a:solidFill>
             <a:schemeClr val="tx1"/>
           </a:solidFill>
@@ -3209,8 +3427,8 @@
           <a:cs typeface="+mn-cs"/>
         </a:defRPr>
       </a:lvl7pPr>
-      <a:lvl8pPr marL="3200400" algn="l" defTabSz="914400" rtl="0" eaLnBrk="1" latinLnBrk="0" hangingPunct="1">
-        <a:defRPr sz="1800" kern="1200">
+      <a:lvl8pPr marL="1920240" algn="l" defTabSz="548640" rtl="0" eaLnBrk="1" latinLnBrk="0" hangingPunct="1">
+        <a:defRPr sz="1080" kern="1200">
           <a:solidFill>
             <a:schemeClr val="tx1"/>
           </a:solidFill>
@@ -3219,8 +3437,8 @@
           <a:cs typeface="+mn-cs"/>
         </a:defRPr>
       </a:lvl8pPr>
-      <a:lvl9pPr marL="3657600" algn="l" defTabSz="914400" rtl="0" eaLnBrk="1" latinLnBrk="0" hangingPunct="1">
-        <a:defRPr sz="1800" kern="1200">
+      <a:lvl9pPr marL="2194560" algn="l" defTabSz="548640" rtl="0" eaLnBrk="1" latinLnBrk="0" hangingPunct="1">
+        <a:defRPr sz="1080" kern="1200">
           <a:solidFill>
             <a:schemeClr val="tx1"/>
           </a:solidFill>
@@ -3253,10 +3471,10 @@
       </p:grpSpPr>
       <p:sp>
         <p:nvSpPr>
-          <p:cNvPr id="4" name="Freeform: Shape 3">
+          <p:cNvPr id="18" name="Freeform: Shape 17">
             <a:extLst>
               <a:ext uri="{FF2B5EF4-FFF2-40B4-BE49-F238E27FC236}">
-                <a16:creationId xmlns:a16="http://schemas.microsoft.com/office/drawing/2014/main" id="{4E936606-F1B2-4456-AB69-711456B503DF}"/>
+                <a16:creationId xmlns:a16="http://schemas.microsoft.com/office/drawing/2014/main" id="{4626C16A-FC72-4781-9B8B-96DB1B0F203C}"/>
               </a:ext>
             </a:extLst>
           </p:cNvPr>
@@ -3265,417 +3483,8 @@
         </p:nvSpPr>
         <p:spPr>
           <a:xfrm>
-            <a:off x="60961" y="687186"/>
-            <a:ext cx="2424545" cy="2741814"/>
-          </a:xfrm>
-          <a:custGeom>
-            <a:avLst/>
-            <a:gdLst>
-              <a:gd name="connsiteX0" fmla="*/ 0 w 1197033"/>
-              <a:gd name="connsiteY0" fmla="*/ 1424247 h 1479666"/>
-              <a:gd name="connsiteX1" fmla="*/ 16626 w 1197033"/>
-              <a:gd name="connsiteY1" fmla="*/ 5542 h 1479666"/>
-              <a:gd name="connsiteX2" fmla="*/ 1197033 w 1197033"/>
-              <a:gd name="connsiteY2" fmla="*/ 0 h 1479666"/>
-              <a:gd name="connsiteX3" fmla="*/ 1191491 w 1197033"/>
-              <a:gd name="connsiteY3" fmla="*/ 1390997 h 1479666"/>
-              <a:gd name="connsiteX4" fmla="*/ 1030778 w 1197033"/>
-              <a:gd name="connsiteY4" fmla="*/ 1235826 h 1479666"/>
-              <a:gd name="connsiteX5" fmla="*/ 964277 w 1197033"/>
-              <a:gd name="connsiteY5" fmla="*/ 1346662 h 1479666"/>
-              <a:gd name="connsiteX6" fmla="*/ 798022 w 1197033"/>
-              <a:gd name="connsiteY6" fmla="*/ 1263535 h 1479666"/>
-              <a:gd name="connsiteX7" fmla="*/ 598517 w 1197033"/>
-              <a:gd name="connsiteY7" fmla="*/ 1435331 h 1479666"/>
-              <a:gd name="connsiteX8" fmla="*/ 482138 w 1197033"/>
-              <a:gd name="connsiteY8" fmla="*/ 1363287 h 1479666"/>
-              <a:gd name="connsiteX9" fmla="*/ 338051 w 1197033"/>
-              <a:gd name="connsiteY9" fmla="*/ 1479666 h 1479666"/>
-              <a:gd name="connsiteX10" fmla="*/ 243840 w 1197033"/>
-              <a:gd name="connsiteY10" fmla="*/ 1313411 h 1479666"/>
-              <a:gd name="connsiteX11" fmla="*/ 0 w 1197033"/>
-              <a:gd name="connsiteY11" fmla="*/ 1424247 h 1479666"/>
-            </a:gdLst>
-            <a:ahLst/>
-            <a:cxnLst>
-              <a:cxn ang="0">
-                <a:pos x="connsiteX0" y="connsiteY0"/>
-              </a:cxn>
-              <a:cxn ang="0">
-                <a:pos x="connsiteX1" y="connsiteY1"/>
-              </a:cxn>
-              <a:cxn ang="0">
-                <a:pos x="connsiteX2" y="connsiteY2"/>
-              </a:cxn>
-              <a:cxn ang="0">
-                <a:pos x="connsiteX3" y="connsiteY3"/>
-              </a:cxn>
-              <a:cxn ang="0">
-                <a:pos x="connsiteX4" y="connsiteY4"/>
-              </a:cxn>
-              <a:cxn ang="0">
-                <a:pos x="connsiteX5" y="connsiteY5"/>
-              </a:cxn>
-              <a:cxn ang="0">
-                <a:pos x="connsiteX6" y="connsiteY6"/>
-              </a:cxn>
-              <a:cxn ang="0">
-                <a:pos x="connsiteX7" y="connsiteY7"/>
-              </a:cxn>
-              <a:cxn ang="0">
-                <a:pos x="connsiteX8" y="connsiteY8"/>
-              </a:cxn>
-              <a:cxn ang="0">
-                <a:pos x="connsiteX9" y="connsiteY9"/>
-              </a:cxn>
-              <a:cxn ang="0">
-                <a:pos x="connsiteX10" y="connsiteY10"/>
-              </a:cxn>
-              <a:cxn ang="0">
-                <a:pos x="connsiteX11" y="connsiteY11"/>
-              </a:cxn>
-            </a:cxnLst>
-            <a:rect l="l" t="t" r="r" b="b"/>
-            <a:pathLst>
-              <a:path w="1197033" h="1479666">
-                <a:moveTo>
-                  <a:pt x="0" y="1424247"/>
-                </a:moveTo>
-                <a:lnTo>
-                  <a:pt x="16626" y="5542"/>
-                </a:lnTo>
-                <a:lnTo>
-                  <a:pt x="1197033" y="0"/>
-                </a:lnTo>
-                <a:cubicBezTo>
-                  <a:pt x="1195186" y="463666"/>
-                  <a:pt x="1193338" y="927331"/>
-                  <a:pt x="1191491" y="1390997"/>
-                </a:cubicBezTo>
-                <a:lnTo>
-                  <a:pt x="1030778" y="1235826"/>
-                </a:lnTo>
-                <a:lnTo>
-                  <a:pt x="964277" y="1346662"/>
-                </a:lnTo>
-                <a:lnTo>
-                  <a:pt x="798022" y="1263535"/>
-                </a:lnTo>
-                <a:lnTo>
-                  <a:pt x="598517" y="1435331"/>
-                </a:lnTo>
-                <a:lnTo>
-                  <a:pt x="482138" y="1363287"/>
-                </a:lnTo>
-                <a:lnTo>
-                  <a:pt x="338051" y="1479666"/>
-                </a:lnTo>
-                <a:lnTo>
-                  <a:pt x="243840" y="1313411"/>
-                </a:lnTo>
-                <a:lnTo>
-                  <a:pt x="0" y="1424247"/>
-                </a:lnTo>
-                <a:close/>
-              </a:path>
-            </a:pathLst>
-          </a:custGeom>
-          <a:noFill/>
-        </p:spPr>
-        <p:style>
-          <a:lnRef idx="2">
-            <a:schemeClr val="accent1">
-              <a:shade val="50000"/>
-            </a:schemeClr>
-          </a:lnRef>
-          <a:fillRef idx="1">
-            <a:schemeClr val="accent1"/>
-          </a:fillRef>
-          <a:effectRef idx="0">
-            <a:schemeClr val="accent1"/>
-          </a:effectRef>
-          <a:fontRef idx="minor">
-            <a:schemeClr val="lt1"/>
-          </a:fontRef>
-        </p:style>
-        <p:txBody>
-          <a:bodyPr rtlCol="0" anchor="t" anchorCtr="0"/>
-          <a:lstStyle/>
-          <a:p>
-            <a:r>
-              <a:rPr lang="en-US" sz="1200" dirty="0">
-                <a:solidFill>
-                  <a:schemeClr val="tx1"/>
-                </a:solidFill>
-              </a:rPr>
-              <a:t>result = </a:t>
-            </a:r>
-            <a:r>
-              <a:rPr lang="en-US" sz="1200" dirty="0" err="1">
-                <a:solidFill>
-                  <a:schemeClr val="tx1"/>
-                </a:solidFill>
-              </a:rPr>
-              <a:t>nextEvent</a:t>
-            </a:r>
-            <a:r>
-              <a:rPr lang="en-US" sz="1200" dirty="0">
-                <a:solidFill>
-                  <a:schemeClr val="tx1"/>
-                </a:solidFill>
-              </a:rPr>
-              <a:t>(…);</a:t>
-            </a:r>
-          </a:p>
-          <a:p>
-            <a:r>
-              <a:rPr lang="en-US" sz="1200" dirty="0">
-                <a:solidFill>
-                  <a:schemeClr val="tx1"/>
-                </a:solidFill>
-              </a:rPr>
-              <a:t>If result == true</a:t>
-            </a:r>
-          </a:p>
-          <a:p>
-            <a:r>
-              <a:rPr lang="en-US" sz="1200" dirty="0">
-                <a:solidFill>
-                  <a:schemeClr val="tx1"/>
-                </a:solidFill>
-              </a:rPr>
-              <a:t>if (</a:t>
-            </a:r>
-            <a:r>
-              <a:rPr lang="en-US" sz="1200" dirty="0" err="1">
-                <a:solidFill>
-                  <a:schemeClr val="tx1"/>
-                </a:solidFill>
-              </a:rPr>
-              <a:t>EventHandler.status</a:t>
-            </a:r>
-            <a:r>
-              <a:rPr lang="en-US" sz="1200" dirty="0">
-                <a:solidFill>
-                  <a:schemeClr val="tx1"/>
-                </a:solidFill>
-              </a:rPr>
-              <a:t> == PROP_DONE_OK)</a:t>
-            </a:r>
-          </a:p>
-          <a:p>
-            <a:r>
-              <a:rPr lang="en-US" sz="1200" dirty="0">
-                <a:solidFill>
-                  <a:schemeClr val="tx1"/>
-                </a:solidFill>
-              </a:rPr>
-              <a:t>if (</a:t>
-            </a:r>
-            <a:r>
-              <a:rPr lang="en-US" sz="1200" dirty="0" err="1">
-                <a:solidFill>
-                  <a:schemeClr val="tx1"/>
-                </a:solidFill>
-              </a:rPr>
-              <a:t>rxStatistics.nRxOk</a:t>
-            </a:r>
-            <a:r>
-              <a:rPr lang="en-US" sz="1200" dirty="0">
-                <a:solidFill>
-                  <a:schemeClr val="tx1"/>
-                </a:solidFill>
-              </a:rPr>
-              <a:t> == 1 )</a:t>
-            </a:r>
-          </a:p>
-          <a:p>
-            <a:r>
-              <a:rPr lang="en-US" sz="1200" dirty="0" err="1">
-                <a:solidFill>
-                  <a:schemeClr val="tx1"/>
-                </a:solidFill>
-              </a:rPr>
-              <a:t>rxPacket</a:t>
-            </a:r>
-            <a:r>
-              <a:rPr lang="en-US" sz="1200" dirty="0">
-                <a:solidFill>
-                  <a:schemeClr val="tx1"/>
-                </a:solidFill>
-              </a:rPr>
-              <a:t>-&gt;</a:t>
-            </a:r>
-            <a:r>
-              <a:rPr lang="en-US" sz="1200" dirty="0" err="1">
-                <a:solidFill>
-                  <a:schemeClr val="tx1"/>
-                </a:solidFill>
-              </a:rPr>
-              <a:t>len</a:t>
-            </a:r>
-            <a:r>
-              <a:rPr lang="en-US" sz="1200" dirty="0">
-                <a:solidFill>
-                  <a:schemeClr val="tx1"/>
-                </a:solidFill>
-              </a:rPr>
-              <a:t> = ...</a:t>
-            </a:r>
-          </a:p>
-          <a:p>
-            <a:r>
-              <a:rPr lang="en-US" sz="1200" dirty="0" err="1">
-                <a:solidFill>
-                  <a:schemeClr val="tx1"/>
-                </a:solidFill>
-              </a:rPr>
-              <a:t>rxPacket</a:t>
-            </a:r>
-            <a:r>
-              <a:rPr lang="en-US" sz="1200" dirty="0">
-                <a:solidFill>
-                  <a:schemeClr val="tx1"/>
-                </a:solidFill>
-              </a:rPr>
-              <a:t>-&gt;</a:t>
-            </a:r>
-            <a:r>
-              <a:rPr lang="en-US" sz="1200" dirty="0" err="1">
-                <a:solidFill>
-                  <a:schemeClr val="tx1"/>
-                </a:solidFill>
-              </a:rPr>
-              <a:t>dstAddr</a:t>
-            </a:r>
-            <a:r>
-              <a:rPr lang="en-US" sz="1200" dirty="0">
-                <a:solidFill>
-                  <a:schemeClr val="tx1"/>
-                </a:solidFill>
-              </a:rPr>
-              <a:t> = ...</a:t>
-            </a:r>
-          </a:p>
-          <a:p>
-            <a:r>
-              <a:rPr lang="en-US" sz="1200" dirty="0" err="1">
-                <a:solidFill>
-                  <a:schemeClr val="tx1"/>
-                </a:solidFill>
-              </a:rPr>
-              <a:t>rxPacket</a:t>
-            </a:r>
-            <a:r>
-              <a:rPr lang="en-US" sz="1200" dirty="0">
-                <a:solidFill>
-                  <a:schemeClr val="tx1"/>
-                </a:solidFill>
-              </a:rPr>
-              <a:t>-&gt;payload = …</a:t>
-            </a:r>
-          </a:p>
-          <a:p>
-            <a:r>
-              <a:rPr lang="en-US" sz="1200" dirty="0" err="1">
-                <a:solidFill>
-                  <a:schemeClr val="tx1"/>
-                </a:solidFill>
-              </a:rPr>
-              <a:t>rxPacket</a:t>
-            </a:r>
-            <a:r>
-              <a:rPr lang="en-US" sz="1200" dirty="0">
-                <a:solidFill>
-                  <a:schemeClr val="tx1"/>
-                </a:solidFill>
-              </a:rPr>
-              <a:t>-&gt;</a:t>
-            </a:r>
-            <a:r>
-              <a:rPr lang="en-US" sz="1200" dirty="0" err="1">
-                <a:solidFill>
-                  <a:schemeClr val="tx1"/>
-                </a:solidFill>
-              </a:rPr>
-              <a:t>rssi</a:t>
-            </a:r>
-            <a:r>
-              <a:rPr lang="en-US" sz="1200" dirty="0">
-                <a:solidFill>
-                  <a:schemeClr val="tx1"/>
-                </a:solidFill>
-              </a:rPr>
-              <a:t> = </a:t>
-            </a:r>
-            <a:r>
-              <a:rPr lang="en-US" sz="1200" dirty="0" err="1">
-                <a:solidFill>
-                  <a:schemeClr val="tx1"/>
-                </a:solidFill>
-              </a:rPr>
-              <a:t>rxStatistics.lastRssi</a:t>
-            </a:r>
-            <a:r>
-              <a:rPr lang="en-US" sz="1200" dirty="0">
-                <a:solidFill>
-                  <a:schemeClr val="tx1"/>
-                </a:solidFill>
-              </a:rPr>
-              <a:t>; </a:t>
-            </a:r>
-          </a:p>
-          <a:p>
-            <a:r>
-              <a:rPr lang="en-US" sz="1200" dirty="0">
-                <a:solidFill>
-                  <a:schemeClr val="tx1"/>
-                </a:solidFill>
-              </a:rPr>
-              <a:t>status = </a:t>
-            </a:r>
-            <a:r>
-              <a:rPr lang="en-US" sz="1200" dirty="0" err="1">
-                <a:solidFill>
-                  <a:schemeClr val="tx1"/>
-                </a:solidFill>
-              </a:rPr>
-              <a:t>EasyLink_Status_Success</a:t>
-            </a:r>
-            <a:r>
-              <a:rPr lang="en-US" sz="1200" dirty="0">
-                <a:solidFill>
-                  <a:schemeClr val="tx1"/>
-                </a:solidFill>
-              </a:rPr>
-              <a:t>; </a:t>
-            </a:r>
-          </a:p>
-          <a:p>
-            <a:endParaRPr lang="en-US" sz="1200" dirty="0">
-              <a:solidFill>
-                <a:schemeClr val="tx1"/>
-              </a:solidFill>
-            </a:endParaRPr>
-          </a:p>
-        </p:txBody>
-      </p:sp>
-      <p:sp>
-        <p:nvSpPr>
-          <p:cNvPr id="5" name="Freeform: Shape 4">
-            <a:extLst>
-              <a:ext uri="{FF2B5EF4-FFF2-40B4-BE49-F238E27FC236}">
-                <a16:creationId xmlns:a16="http://schemas.microsoft.com/office/drawing/2014/main" id="{642E80F8-A808-489E-8FB1-293379AC7E77}"/>
-              </a:ext>
-            </a:extLst>
-          </p:cNvPr>
-          <p:cNvSpPr/>
-          <p:nvPr/>
-        </p:nvSpPr>
-        <p:spPr>
-          <a:xfrm>
-            <a:off x="2371899" y="839835"/>
-            <a:ext cx="1845424" cy="1105337"/>
+            <a:off x="144661" y="395819"/>
+            <a:ext cx="2176612" cy="2455169"/>
           </a:xfrm>
           <a:custGeom>
             <a:avLst/>
@@ -3845,6 +3654,375 @@
                   <a:schemeClr val="tx1"/>
                 </a:solidFill>
               </a:rPr>
+              <a:t>If result == true</a:t>
+            </a:r>
+          </a:p>
+          <a:p>
+            <a:r>
+              <a:rPr lang="en-US" sz="1200" dirty="0">
+                <a:solidFill>
+                  <a:schemeClr val="tx1"/>
+                </a:solidFill>
+              </a:rPr>
+              <a:t>if (</a:t>
+            </a:r>
+            <a:r>
+              <a:rPr lang="en-US" sz="1200" dirty="0" err="1">
+                <a:solidFill>
+                  <a:schemeClr val="tx1"/>
+                </a:solidFill>
+              </a:rPr>
+              <a:t>rxStats.ok</a:t>
+            </a:r>
+            <a:r>
+              <a:rPr lang="en-US" sz="1200" dirty="0">
+                <a:solidFill>
+                  <a:schemeClr val="tx1"/>
+                </a:solidFill>
+              </a:rPr>
+              <a:t> == 1 )</a:t>
+            </a:r>
+          </a:p>
+          <a:p>
+            <a:r>
+              <a:rPr lang="en-US" sz="1200" dirty="0" err="1">
+                <a:solidFill>
+                  <a:schemeClr val="tx1"/>
+                </a:solidFill>
+              </a:rPr>
+              <a:t>rxPacket</a:t>
+            </a:r>
+            <a:r>
+              <a:rPr lang="en-US" sz="1200" dirty="0">
+                <a:solidFill>
+                  <a:schemeClr val="tx1"/>
+                </a:solidFill>
+              </a:rPr>
+              <a:t>-&gt;</a:t>
+            </a:r>
+            <a:r>
+              <a:rPr lang="en-US" sz="1200" dirty="0" err="1">
+                <a:solidFill>
+                  <a:schemeClr val="tx1"/>
+                </a:solidFill>
+              </a:rPr>
+              <a:t>len</a:t>
+            </a:r>
+            <a:r>
+              <a:rPr lang="en-US" sz="1200" dirty="0">
+                <a:solidFill>
+                  <a:schemeClr val="tx1"/>
+                </a:solidFill>
+              </a:rPr>
+              <a:t> = ...</a:t>
+            </a:r>
+          </a:p>
+          <a:p>
+            <a:r>
+              <a:rPr lang="en-US" sz="1200" dirty="0" err="1">
+                <a:solidFill>
+                  <a:schemeClr val="tx1"/>
+                </a:solidFill>
+              </a:rPr>
+              <a:t>rxPacket</a:t>
+            </a:r>
+            <a:r>
+              <a:rPr lang="en-US" sz="1200" dirty="0">
+                <a:solidFill>
+                  <a:schemeClr val="tx1"/>
+                </a:solidFill>
+              </a:rPr>
+              <a:t>-&gt;</a:t>
+            </a:r>
+            <a:r>
+              <a:rPr lang="en-US" sz="1200" dirty="0" err="1">
+                <a:solidFill>
+                  <a:schemeClr val="tx1"/>
+                </a:solidFill>
+              </a:rPr>
+              <a:t>dstAddr</a:t>
+            </a:r>
+            <a:r>
+              <a:rPr lang="en-US" sz="1200" dirty="0">
+                <a:solidFill>
+                  <a:schemeClr val="tx1"/>
+                </a:solidFill>
+              </a:rPr>
+              <a:t> = ...</a:t>
+            </a:r>
+          </a:p>
+          <a:p>
+            <a:r>
+              <a:rPr lang="en-US" sz="1200" dirty="0" err="1">
+                <a:solidFill>
+                  <a:schemeClr val="tx1"/>
+                </a:solidFill>
+              </a:rPr>
+              <a:t>rxPacket</a:t>
+            </a:r>
+            <a:r>
+              <a:rPr lang="en-US" sz="1200" dirty="0">
+                <a:solidFill>
+                  <a:schemeClr val="tx1"/>
+                </a:solidFill>
+              </a:rPr>
+              <a:t>-&gt;payload = …</a:t>
+            </a:r>
+          </a:p>
+          <a:p>
+            <a:r>
+              <a:rPr lang="en-US" sz="1200" dirty="0" err="1">
+                <a:solidFill>
+                  <a:schemeClr val="tx1"/>
+                </a:solidFill>
+              </a:rPr>
+              <a:t>rxPacket</a:t>
+            </a:r>
+            <a:r>
+              <a:rPr lang="en-US" sz="1200" dirty="0">
+                <a:solidFill>
+                  <a:schemeClr val="tx1"/>
+                </a:solidFill>
+              </a:rPr>
+              <a:t>-&gt;</a:t>
+            </a:r>
+            <a:r>
+              <a:rPr lang="en-US" sz="1200" dirty="0" err="1">
+                <a:solidFill>
+                  <a:schemeClr val="tx1"/>
+                </a:solidFill>
+              </a:rPr>
+              <a:t>rssi</a:t>
+            </a:r>
+            <a:r>
+              <a:rPr lang="en-US" sz="1200" dirty="0">
+                <a:solidFill>
+                  <a:schemeClr val="tx1"/>
+                </a:solidFill>
+              </a:rPr>
+              <a:t> = </a:t>
+            </a:r>
+            <a:r>
+              <a:rPr lang="en-US" sz="1200" dirty="0" err="1">
+                <a:solidFill>
+                  <a:schemeClr val="tx1"/>
+                </a:solidFill>
+              </a:rPr>
+              <a:t>rxStats.lastRssi</a:t>
+            </a:r>
+            <a:r>
+              <a:rPr lang="en-US" sz="1200" dirty="0">
+                <a:solidFill>
+                  <a:schemeClr val="tx1"/>
+                </a:solidFill>
+              </a:rPr>
+              <a:t>; </a:t>
+            </a:r>
+          </a:p>
+          <a:p>
+            <a:r>
+              <a:rPr lang="en-US" sz="1200" dirty="0">
+                <a:solidFill>
+                  <a:schemeClr val="tx1"/>
+                </a:solidFill>
+              </a:rPr>
+              <a:t>status = Success; </a:t>
+            </a:r>
+          </a:p>
+          <a:p>
+            <a:endParaRPr lang="en-US" sz="1200" dirty="0">
+              <a:solidFill>
+                <a:schemeClr val="tx1"/>
+              </a:solidFill>
+            </a:endParaRPr>
+          </a:p>
+        </p:txBody>
+      </p:sp>
+      <p:sp>
+        <p:nvSpPr>
+          <p:cNvPr id="19" name="Freeform: Shape 18">
+            <a:extLst>
+              <a:ext uri="{FF2B5EF4-FFF2-40B4-BE49-F238E27FC236}">
+                <a16:creationId xmlns:a16="http://schemas.microsoft.com/office/drawing/2014/main" id="{4CCE80B4-87B1-4B23-85C8-B34A25CF164D}"/>
+              </a:ext>
+            </a:extLst>
+          </p:cNvPr>
+          <p:cNvSpPr/>
+          <p:nvPr/>
+        </p:nvSpPr>
+        <p:spPr>
+          <a:xfrm>
+            <a:off x="2181760" y="605420"/>
+            <a:ext cx="1598092" cy="883306"/>
+          </a:xfrm>
+          <a:custGeom>
+            <a:avLst/>
+            <a:gdLst>
+              <a:gd name="connsiteX0" fmla="*/ 0 w 1197033"/>
+              <a:gd name="connsiteY0" fmla="*/ 1424247 h 1479666"/>
+              <a:gd name="connsiteX1" fmla="*/ 16626 w 1197033"/>
+              <a:gd name="connsiteY1" fmla="*/ 5542 h 1479666"/>
+              <a:gd name="connsiteX2" fmla="*/ 1197033 w 1197033"/>
+              <a:gd name="connsiteY2" fmla="*/ 0 h 1479666"/>
+              <a:gd name="connsiteX3" fmla="*/ 1191491 w 1197033"/>
+              <a:gd name="connsiteY3" fmla="*/ 1390997 h 1479666"/>
+              <a:gd name="connsiteX4" fmla="*/ 1030778 w 1197033"/>
+              <a:gd name="connsiteY4" fmla="*/ 1235826 h 1479666"/>
+              <a:gd name="connsiteX5" fmla="*/ 964277 w 1197033"/>
+              <a:gd name="connsiteY5" fmla="*/ 1346662 h 1479666"/>
+              <a:gd name="connsiteX6" fmla="*/ 798022 w 1197033"/>
+              <a:gd name="connsiteY6" fmla="*/ 1263535 h 1479666"/>
+              <a:gd name="connsiteX7" fmla="*/ 598517 w 1197033"/>
+              <a:gd name="connsiteY7" fmla="*/ 1435331 h 1479666"/>
+              <a:gd name="connsiteX8" fmla="*/ 482138 w 1197033"/>
+              <a:gd name="connsiteY8" fmla="*/ 1363287 h 1479666"/>
+              <a:gd name="connsiteX9" fmla="*/ 338051 w 1197033"/>
+              <a:gd name="connsiteY9" fmla="*/ 1479666 h 1479666"/>
+              <a:gd name="connsiteX10" fmla="*/ 243840 w 1197033"/>
+              <a:gd name="connsiteY10" fmla="*/ 1313411 h 1479666"/>
+              <a:gd name="connsiteX11" fmla="*/ 0 w 1197033"/>
+              <a:gd name="connsiteY11" fmla="*/ 1424247 h 1479666"/>
+            </a:gdLst>
+            <a:ahLst/>
+            <a:cxnLst>
+              <a:cxn ang="0">
+                <a:pos x="connsiteX0" y="connsiteY0"/>
+              </a:cxn>
+              <a:cxn ang="0">
+                <a:pos x="connsiteX1" y="connsiteY1"/>
+              </a:cxn>
+              <a:cxn ang="0">
+                <a:pos x="connsiteX2" y="connsiteY2"/>
+              </a:cxn>
+              <a:cxn ang="0">
+                <a:pos x="connsiteX3" y="connsiteY3"/>
+              </a:cxn>
+              <a:cxn ang="0">
+                <a:pos x="connsiteX4" y="connsiteY4"/>
+              </a:cxn>
+              <a:cxn ang="0">
+                <a:pos x="connsiteX5" y="connsiteY5"/>
+              </a:cxn>
+              <a:cxn ang="0">
+                <a:pos x="connsiteX6" y="connsiteY6"/>
+              </a:cxn>
+              <a:cxn ang="0">
+                <a:pos x="connsiteX7" y="connsiteY7"/>
+              </a:cxn>
+              <a:cxn ang="0">
+                <a:pos x="connsiteX8" y="connsiteY8"/>
+              </a:cxn>
+              <a:cxn ang="0">
+                <a:pos x="connsiteX9" y="connsiteY9"/>
+              </a:cxn>
+              <a:cxn ang="0">
+                <a:pos x="connsiteX10" y="connsiteY10"/>
+              </a:cxn>
+              <a:cxn ang="0">
+                <a:pos x="connsiteX11" y="connsiteY11"/>
+              </a:cxn>
+            </a:cxnLst>
+            <a:rect l="l" t="t" r="r" b="b"/>
+            <a:pathLst>
+              <a:path w="1197033" h="1479666">
+                <a:moveTo>
+                  <a:pt x="0" y="1424247"/>
+                </a:moveTo>
+                <a:lnTo>
+                  <a:pt x="16626" y="5542"/>
+                </a:lnTo>
+                <a:lnTo>
+                  <a:pt x="1197033" y="0"/>
+                </a:lnTo>
+                <a:cubicBezTo>
+                  <a:pt x="1195186" y="463666"/>
+                  <a:pt x="1193338" y="927331"/>
+                  <a:pt x="1191491" y="1390997"/>
+                </a:cubicBezTo>
+                <a:lnTo>
+                  <a:pt x="1030778" y="1235826"/>
+                </a:lnTo>
+                <a:lnTo>
+                  <a:pt x="964277" y="1346662"/>
+                </a:lnTo>
+                <a:lnTo>
+                  <a:pt x="798022" y="1263535"/>
+                </a:lnTo>
+                <a:lnTo>
+                  <a:pt x="598517" y="1435331"/>
+                </a:lnTo>
+                <a:lnTo>
+                  <a:pt x="482138" y="1363287"/>
+                </a:lnTo>
+                <a:lnTo>
+                  <a:pt x="338051" y="1479666"/>
+                </a:lnTo>
+                <a:lnTo>
+                  <a:pt x="243840" y="1313411"/>
+                </a:lnTo>
+                <a:lnTo>
+                  <a:pt x="0" y="1424247"/>
+                </a:lnTo>
+                <a:close/>
+              </a:path>
+            </a:pathLst>
+          </a:custGeom>
+          <a:solidFill>
+            <a:schemeClr val="bg1"/>
+          </a:solidFill>
+        </p:spPr>
+        <p:style>
+          <a:lnRef idx="2">
+            <a:schemeClr val="accent1">
+              <a:shade val="50000"/>
+            </a:schemeClr>
+          </a:lnRef>
+          <a:fillRef idx="1">
+            <a:schemeClr val="accent1"/>
+          </a:fillRef>
+          <a:effectRef idx="0">
+            <a:schemeClr val="accent1"/>
+          </a:effectRef>
+          <a:fontRef idx="minor">
+            <a:schemeClr val="lt1"/>
+          </a:fontRef>
+        </p:style>
+        <p:txBody>
+          <a:bodyPr rtlCol="0" anchor="t" anchorCtr="0"/>
+          <a:lstStyle/>
+          <a:p>
+            <a:r>
+              <a:rPr lang="en-US" sz="1200" dirty="0">
+                <a:solidFill>
+                  <a:schemeClr val="tx1"/>
+                </a:solidFill>
+              </a:rPr>
+              <a:t>result = </a:t>
+            </a:r>
+            <a:r>
+              <a:rPr lang="en-US" sz="1200" dirty="0" err="1">
+                <a:solidFill>
+                  <a:schemeClr val="tx1"/>
+                </a:solidFill>
+              </a:rPr>
+              <a:t>nextEvent</a:t>
+            </a:r>
+            <a:r>
+              <a:rPr lang="en-US" sz="1200" dirty="0">
+                <a:solidFill>
+                  <a:schemeClr val="tx1"/>
+                </a:solidFill>
+              </a:rPr>
+              <a:t>(…);</a:t>
+            </a:r>
+          </a:p>
+          <a:p>
+            <a:r>
+              <a:rPr lang="en-US" sz="1200" dirty="0">
+                <a:solidFill>
+                  <a:schemeClr val="tx1"/>
+                </a:solidFill>
+              </a:rPr>
               <a:t>If result == false</a:t>
             </a:r>
           </a:p>
@@ -3870,10 +4048,10 @@
       </p:sp>
       <p:cxnSp>
         <p:nvCxnSpPr>
-          <p:cNvPr id="7" name="Straight Connector 6">
+          <p:cNvPr id="21" name="Straight Connector 20">
             <a:extLst>
               <a:ext uri="{FF2B5EF4-FFF2-40B4-BE49-F238E27FC236}">
-                <a16:creationId xmlns:a16="http://schemas.microsoft.com/office/drawing/2014/main" id="{E78BE08A-93AA-4AD6-8B48-9B3A8F615080}"/>
+                <a16:creationId xmlns:a16="http://schemas.microsoft.com/office/drawing/2014/main" id="{7EF4FFD3-C207-4AD3-8776-FEB93D894FF9}"/>
               </a:ext>
             </a:extLst>
           </p:cNvPr>
@@ -3884,8 +4062,8 @@
         </p:nvCxnSpPr>
         <p:spPr>
           <a:xfrm>
-            <a:off x="164868" y="2654531"/>
-            <a:ext cx="2207030" cy="0"/>
+            <a:off x="248567" y="2092033"/>
+            <a:ext cx="1991380" cy="0"/>
           </a:xfrm>
           <a:prstGeom prst="line">
             <a:avLst/>
@@ -3914,10 +4092,10 @@
       </p:cxnSp>
       <p:cxnSp>
         <p:nvCxnSpPr>
-          <p:cNvPr id="8" name="Straight Connector 7">
+          <p:cNvPr id="22" name="Straight Connector 21">
             <a:extLst>
               <a:ext uri="{FF2B5EF4-FFF2-40B4-BE49-F238E27FC236}">
-                <a16:creationId xmlns:a16="http://schemas.microsoft.com/office/drawing/2014/main" id="{12D8DF9D-8AA2-4A3F-AA1E-32622C0BC06E}"/>
+                <a16:creationId xmlns:a16="http://schemas.microsoft.com/office/drawing/2014/main" id="{493B2AD1-C8DD-4383-95A6-295C4FC94B6A}"/>
               </a:ext>
             </a:extLst>
           </p:cNvPr>
@@ -3928,8 +4106,8 @@
         </p:nvCxnSpPr>
         <p:spPr>
           <a:xfrm>
-            <a:off x="164868" y="626224"/>
-            <a:ext cx="2320638" cy="0"/>
+            <a:off x="248568" y="334856"/>
+            <a:ext cx="2061709" cy="0"/>
           </a:xfrm>
           <a:prstGeom prst="line">
             <a:avLst/>
@@ -3958,10 +4136,10 @@
       </p:cxnSp>
       <p:cxnSp>
         <p:nvCxnSpPr>
-          <p:cNvPr id="10" name="Straight Connector 9">
+          <p:cNvPr id="23" name="Straight Connector 22">
             <a:extLst>
               <a:ext uri="{FF2B5EF4-FFF2-40B4-BE49-F238E27FC236}">
-                <a16:creationId xmlns:a16="http://schemas.microsoft.com/office/drawing/2014/main" id="{E1A0209C-C8CD-415E-A9CE-156CBC4B6DDC}"/>
+                <a16:creationId xmlns:a16="http://schemas.microsoft.com/office/drawing/2014/main" id="{F7717D02-0ED2-4E28-948C-3651F8878C9C}"/>
               </a:ext>
             </a:extLst>
           </p:cNvPr>
@@ -3972,8 +4150,8 @@
         </p:nvCxnSpPr>
         <p:spPr>
           <a:xfrm>
-            <a:off x="2430086" y="806585"/>
-            <a:ext cx="1787237" cy="0"/>
+            <a:off x="2239947" y="572169"/>
+            <a:ext cx="1499760" cy="0"/>
           </a:xfrm>
           <a:prstGeom prst="line">
             <a:avLst/>
@@ -4002,10 +4180,10 @@
       </p:cxnSp>
       <p:sp>
         <p:nvSpPr>
-          <p:cNvPr id="11" name="TextBox 10">
+          <p:cNvPr id="24" name="TextBox 23">
             <a:extLst>
               <a:ext uri="{FF2B5EF4-FFF2-40B4-BE49-F238E27FC236}">
-                <a16:creationId xmlns:a16="http://schemas.microsoft.com/office/drawing/2014/main" id="{47BAB675-06BD-4A31-ADD7-34F0B9307E64}"/>
+                <a16:creationId xmlns:a16="http://schemas.microsoft.com/office/drawing/2014/main" id="{42286B17-6D27-4867-BD39-560C1E19963B}"/>
               </a:ext>
             </a:extLst>
           </p:cNvPr>
@@ -4014,8 +4192,8 @@
         </p:nvSpPr>
         <p:spPr>
           <a:xfrm>
-            <a:off x="1501833" y="2675938"/>
-            <a:ext cx="1185949" cy="338554"/>
+            <a:off x="1244258" y="2089513"/>
+            <a:ext cx="1066019" cy="338554"/>
           </a:xfrm>
           <a:prstGeom prst="rect">
             <a:avLst/>
@@ -4041,10 +4219,10 @@
       </p:sp>
       <p:sp>
         <p:nvSpPr>
-          <p:cNvPr id="15" name="Freeform: Shape 14">
+          <p:cNvPr id="25" name="Freeform: Shape 24">
             <a:extLst>
               <a:ext uri="{FF2B5EF4-FFF2-40B4-BE49-F238E27FC236}">
-                <a16:creationId xmlns:a16="http://schemas.microsoft.com/office/drawing/2014/main" id="{47829C96-FF67-4A53-939E-9223E8B51F68}"/>
+                <a16:creationId xmlns:a16="http://schemas.microsoft.com/office/drawing/2014/main" id="{3AA3D2A5-E630-4F79-96B4-4BFA4A38EA21}"/>
               </a:ext>
             </a:extLst>
           </p:cNvPr>
@@ -4053,8 +4231,8 @@
         </p:nvSpPr>
         <p:spPr>
           <a:xfrm>
-            <a:off x="56110" y="3385298"/>
-            <a:ext cx="2424545" cy="633166"/>
+            <a:off x="121874" y="2839707"/>
+            <a:ext cx="2176612" cy="633166"/>
           </a:xfrm>
           <a:custGeom>
             <a:avLst/>
@@ -4277,10 +4455,10 @@
       </p:sp>
       <p:sp>
         <p:nvSpPr>
-          <p:cNvPr id="16" name="TextBox 15">
+          <p:cNvPr id="26" name="TextBox 25">
             <a:extLst>
               <a:ext uri="{FF2B5EF4-FFF2-40B4-BE49-F238E27FC236}">
-                <a16:creationId xmlns:a16="http://schemas.microsoft.com/office/drawing/2014/main" id="{8A8BFFBE-3128-4481-8EC9-78FF1DF26DD2}"/>
+                <a16:creationId xmlns:a16="http://schemas.microsoft.com/office/drawing/2014/main" id="{6F930390-6D1D-45FA-8AF1-BB3A4E10DB66}"/>
               </a:ext>
             </a:extLst>
           </p:cNvPr>
@@ -4289,7 +4467,7 @@
         </p:nvSpPr>
         <p:spPr>
           <a:xfrm>
-            <a:off x="1501833" y="346112"/>
+            <a:off x="1293588" y="54818"/>
             <a:ext cx="1185949" cy="338554"/>
           </a:xfrm>
           <a:prstGeom prst="rect">
@@ -4316,10 +4494,10 @@
       </p:sp>
       <p:sp>
         <p:nvSpPr>
-          <p:cNvPr id="17" name="TextBox 16">
+          <p:cNvPr id="27" name="TextBox 26">
             <a:extLst>
               <a:ext uri="{FF2B5EF4-FFF2-40B4-BE49-F238E27FC236}">
-                <a16:creationId xmlns:a16="http://schemas.microsoft.com/office/drawing/2014/main" id="{D28681A7-EF51-4837-920A-2987BB4798C6}"/>
+                <a16:creationId xmlns:a16="http://schemas.microsoft.com/office/drawing/2014/main" id="{26DB0B34-2BAA-4DD3-AF2D-ACA066D2A22C}"/>
               </a:ext>
             </a:extLst>
           </p:cNvPr>
@@ -4328,7 +4506,7 @@
         </p:nvSpPr>
         <p:spPr>
           <a:xfrm>
-            <a:off x="3208712" y="501282"/>
+            <a:off x="2773319" y="266866"/>
             <a:ext cx="1185949" cy="338554"/>
           </a:xfrm>
           <a:prstGeom prst="rect">
@@ -4355,10 +4533,10 @@
       </p:sp>
       <p:sp>
         <p:nvSpPr>
-          <p:cNvPr id="20" name="Flowchart: Document 19">
+          <p:cNvPr id="28" name="Flowchart: Document 27">
             <a:extLst>
               <a:ext uri="{FF2B5EF4-FFF2-40B4-BE49-F238E27FC236}">
-                <a16:creationId xmlns:a16="http://schemas.microsoft.com/office/drawing/2014/main" id="{C08DE86E-F53D-4B10-9778-144F10C4BC45}"/>
+                <a16:creationId xmlns:a16="http://schemas.microsoft.com/office/drawing/2014/main" id="{D98FE0F3-FBE5-4167-BF20-B25BEB673FFF}"/>
               </a:ext>
             </a:extLst>
           </p:cNvPr>
@@ -4367,8 +4545,8 @@
         </p:nvSpPr>
         <p:spPr>
           <a:xfrm>
-            <a:off x="4646815" y="506823"/>
-            <a:ext cx="4386348" cy="4782590"/>
+            <a:off x="3959268" y="168584"/>
+            <a:ext cx="3286801" cy="3945544"/>
           </a:xfrm>
           <a:prstGeom prst="flowChartDocument">
             <a:avLst/>
@@ -4397,24 +4575,29 @@
           <a:bodyPr rtlCol="0" anchor="t" anchorCtr="0"/>
           <a:lstStyle/>
           <a:p>
-            <a:pPr marL="228600" indent="-228600">
-              <a:buAutoNum type="arabicPlain"/>
-            </a:pPr>
+            <a:r>
+              <a:rPr lang="en-US" sz="1200" dirty="0">
+                <a:solidFill>
+                  <a:schemeClr val="tx1"/>
+                </a:solidFill>
+              </a:rPr>
+              <a:t>Function receive(</a:t>
+            </a:r>
             <a:r>
               <a:rPr lang="en-US" sz="1200" dirty="0" err="1">
                 <a:solidFill>
                   <a:schemeClr val="tx1"/>
                 </a:solidFill>
               </a:rPr>
-              <a:t>EasyLink_Status</a:t>
-            </a:r>
-            <a:r>
-              <a:rPr lang="en-US" sz="1200" dirty="0">
-                <a:solidFill>
-                  <a:schemeClr val="tx1"/>
-                </a:solidFill>
-              </a:rPr>
-              <a:t> </a:t>
+              <a:t>RxPacket</a:t>
+            </a:r>
+            <a:r>
+              <a:rPr lang="en-US" sz="1200" dirty="0">
+                <a:solidFill>
+                  <a:schemeClr val="tx1"/>
+                </a:solidFill>
+              </a:rPr>
+              <a:t> *</a:t>
             </a:r>
             <a:r>
               <a:rPr lang="en-US" sz="1200" dirty="0" err="1">
@@ -4422,15 +4605,25 @@
                   <a:schemeClr val="tx1"/>
                 </a:solidFill>
               </a:rPr>
-              <a:t>EasyLink_receive</a:t>
-            </a:r>
-            <a:r>
-              <a:rPr lang="en-US" sz="1200" dirty="0">
-                <a:solidFill>
-                  <a:schemeClr val="tx1"/>
-                </a:solidFill>
-              </a:rPr>
-              <a:t>(</a:t>
+              <a:t>rxPacket</a:t>
+            </a:r>
+            <a:r>
+              <a:rPr lang="en-US" sz="1200" dirty="0">
+                <a:solidFill>
+                  <a:schemeClr val="tx1"/>
+                </a:solidFill>
+              </a:rPr>
+              <a:t>){</a:t>
+            </a:r>
+          </a:p>
+          <a:p>
+            <a:r>
+              <a:rPr lang="en-US" sz="1200" dirty="0">
+                <a:solidFill>
+                  <a:schemeClr val="tx1"/>
+                </a:solidFill>
+              </a:rPr>
+              <a:t>   status = </a:t>
             </a:r>
             <a:r>
               <a:rPr lang="en-US" sz="1200" dirty="0" err="1">
@@ -4438,68 +4631,7 @@
                   <a:schemeClr val="tx1"/>
                 </a:solidFill>
               </a:rPr>
-              <a:t>RxPacket</a:t>
-            </a:r>
-            <a:r>
-              <a:rPr lang="en-US" sz="1200" dirty="0">
-                <a:solidFill>
-                  <a:schemeClr val="tx1"/>
-                </a:solidFill>
-              </a:rPr>
-              <a:t> *</a:t>
-            </a:r>
-            <a:r>
-              <a:rPr lang="en-US" sz="1200" dirty="0" err="1">
-                <a:solidFill>
-                  <a:schemeClr val="tx1"/>
-                </a:solidFill>
-              </a:rPr>
-              <a:t>rxPacket</a:t>
-            </a:r>
-            <a:r>
-              <a:rPr lang="en-US" sz="1200" dirty="0">
-                <a:solidFill>
-                  <a:schemeClr val="tx1"/>
-                </a:solidFill>
-              </a:rPr>
-              <a:t>){</a:t>
-            </a:r>
-          </a:p>
-          <a:p>
-            <a:pPr marL="228600" indent="-228600">
-              <a:buAutoNum type="arabicPlain"/>
-            </a:pPr>
-            <a:r>
-              <a:rPr lang="en-US" sz="1200" dirty="0">
-                <a:solidFill>
-                  <a:schemeClr val="tx1"/>
-                </a:solidFill>
-              </a:rPr>
-              <a:t>     </a:t>
-            </a:r>
-            <a:r>
-              <a:rPr lang="en-US" sz="1200" dirty="0" err="1">
-                <a:solidFill>
-                  <a:schemeClr val="tx1"/>
-                </a:solidFill>
-              </a:rPr>
-              <a:t>EasyLink_Status</a:t>
-            </a:r>
-            <a:r>
-              <a:rPr lang="en-US" sz="1200" dirty="0">
-                <a:solidFill>
-                  <a:schemeClr val="tx1"/>
-                </a:solidFill>
-              </a:rPr>
-              <a:t> status = </a:t>
-            </a:r>
-            <a:r>
-              <a:rPr lang="en-US" sz="1200" dirty="0" err="1">
-                <a:solidFill>
-                  <a:schemeClr val="tx1"/>
-                </a:solidFill>
-              </a:rPr>
-              <a:t>EasyLink_Status_Rx_Error</a:t>
+              <a:t>Rx_Error</a:t>
             </a:r>
             <a:r>
               <a:rPr lang="en-US" sz="1200" dirty="0">
@@ -4511,22 +4643,26 @@
             </a:r>
           </a:p>
           <a:p>
-            <a:pPr marL="228600" indent="-228600">
-              <a:buAutoNum type="arabicPlain"/>
-            </a:pPr>
-            <a:r>
-              <a:rPr lang="en-US" sz="1200" dirty="0">
-                <a:solidFill>
-                  <a:schemeClr val="tx1"/>
-                </a:solidFill>
-              </a:rPr>
-              <a:t>     Packet* packet;</a:t>
-            </a:r>
-          </a:p>
-          <a:p>
-            <a:pPr marL="228600" indent="-228600">
-              <a:buAutoNum type="arabicPlain"/>
-            </a:pPr>
+            <a:r>
+              <a:rPr lang="en-US" sz="1200" dirty="0">
+                <a:solidFill>
+                  <a:schemeClr val="tx1"/>
+                </a:solidFill>
+              </a:rPr>
+              <a:t>   Packet* packet;</a:t>
+            </a:r>
+          </a:p>
+          <a:p>
+            <a:r>
+              <a:rPr lang="en-US" sz="1200" dirty="0">
+                <a:solidFill>
+                  <a:schemeClr val="tx1"/>
+                </a:solidFill>
+              </a:rPr>
+              <a:t>   …</a:t>
+            </a:r>
+          </a:p>
+          <a:p>
             <a:endParaRPr lang="en-US" sz="1200" dirty="0">
               <a:solidFill>
                 <a:schemeClr val="tx1"/>
@@ -4534,9 +4670,294 @@
             </a:endParaRPr>
           </a:p>
           <a:p>
-            <a:pPr marL="228600" indent="-228600">
-              <a:buAutoNum type="arabicPlain"/>
-            </a:pPr>
+            <a:r>
+              <a:rPr lang="en-US" sz="1200" dirty="0">
+                <a:solidFill>
+                  <a:schemeClr val="tx1"/>
+                </a:solidFill>
+              </a:rPr>
+              <a:t>    result = </a:t>
+            </a:r>
+            <a:r>
+              <a:rPr lang="en-US" sz="1200" dirty="0" err="1">
+                <a:solidFill>
+                  <a:schemeClr val="tx1"/>
+                </a:solidFill>
+              </a:rPr>
+              <a:t>nextEvent</a:t>
+            </a:r>
+            <a:r>
+              <a:rPr lang="en-US" sz="1200" dirty="0">
+                <a:solidFill>
+                  <a:schemeClr val="tx1"/>
+                </a:solidFill>
+              </a:rPr>
+              <a:t>(packet, </a:t>
+            </a:r>
+            <a:r>
+              <a:rPr lang="en-US" sz="1200" dirty="0" err="1">
+                <a:solidFill>
+                  <a:schemeClr val="tx1"/>
+                </a:solidFill>
+              </a:rPr>
+              <a:t>rxStats</a:t>
+            </a:r>
+            <a:r>
+              <a:rPr lang="en-US" sz="1200" dirty="0">
+                <a:solidFill>
+                  <a:schemeClr val="tx1"/>
+                </a:solidFill>
+              </a:rPr>
+              <a:t>);    </a:t>
+            </a:r>
+          </a:p>
+          <a:p>
+            <a:r>
+              <a:rPr lang="en-US" sz="1200" dirty="0">
+                <a:solidFill>
+                  <a:schemeClr val="tx1"/>
+                </a:solidFill>
+              </a:rPr>
+              <a:t>     if (result)    {</a:t>
+            </a:r>
+          </a:p>
+          <a:p>
+            <a:r>
+              <a:rPr lang="en-US" sz="1200" dirty="0">
+                <a:solidFill>
+                  <a:schemeClr val="tx1"/>
+                </a:solidFill>
+              </a:rPr>
+              <a:t>             if </a:t>
+            </a:r>
+            <a:r>
+              <a:rPr lang="en-US" sz="1200" dirty="0" err="1">
+                <a:solidFill>
+                  <a:schemeClr val="tx1"/>
+                </a:solidFill>
+              </a:rPr>
+              <a:t>rxStats.ok</a:t>
+            </a:r>
+            <a:r>
+              <a:rPr lang="en-US" sz="1200" dirty="0">
+                <a:solidFill>
+                  <a:schemeClr val="tx1"/>
+                </a:solidFill>
+              </a:rPr>
+              <a:t> == 1   { </a:t>
+            </a:r>
+          </a:p>
+          <a:p>
+            <a:r>
+              <a:rPr lang="en-US" sz="1200" dirty="0">
+                <a:solidFill>
+                  <a:schemeClr val="tx1"/>
+                </a:solidFill>
+              </a:rPr>
+              <a:t>                 </a:t>
+            </a:r>
+            <a:r>
+              <a:rPr lang="en-US" sz="1200" dirty="0" err="1">
+                <a:solidFill>
+                  <a:schemeClr val="tx1"/>
+                </a:solidFill>
+              </a:rPr>
+              <a:t>rxpacket</a:t>
+            </a:r>
+            <a:r>
+              <a:rPr lang="en-US" sz="1200" dirty="0">
+                <a:solidFill>
+                  <a:schemeClr val="tx1"/>
+                </a:solidFill>
+              </a:rPr>
+              <a:t>-&gt;</a:t>
+            </a:r>
+            <a:r>
+              <a:rPr lang="en-US" sz="1200" dirty="0" err="1">
+                <a:solidFill>
+                  <a:schemeClr val="tx1"/>
+                </a:solidFill>
+              </a:rPr>
+              <a:t>len</a:t>
+            </a:r>
+            <a:r>
+              <a:rPr lang="en-US" sz="1200" dirty="0">
+                <a:solidFill>
+                  <a:schemeClr val="tx1"/>
+                </a:solidFill>
+              </a:rPr>
+              <a:t> = packet-&gt;</a:t>
+            </a:r>
+            <a:r>
+              <a:rPr lang="en-US" sz="1200" dirty="0" err="1">
+                <a:solidFill>
+                  <a:schemeClr val="tx1"/>
+                </a:solidFill>
+              </a:rPr>
+              <a:t>len</a:t>
+            </a:r>
+            <a:r>
+              <a:rPr lang="en-US" sz="1200" dirty="0">
+                <a:solidFill>
+                  <a:schemeClr val="tx1"/>
+                </a:solidFill>
+              </a:rPr>
+              <a:t>;</a:t>
+            </a:r>
+          </a:p>
+          <a:p>
+            <a:r>
+              <a:rPr lang="en-US" sz="1200" dirty="0">
+                <a:solidFill>
+                  <a:schemeClr val="tx1"/>
+                </a:solidFill>
+              </a:rPr>
+              <a:t>                 </a:t>
+            </a:r>
+            <a:r>
+              <a:rPr lang="en-US" sz="1200" dirty="0" err="1">
+                <a:solidFill>
+                  <a:schemeClr val="tx1"/>
+                </a:solidFill>
+              </a:rPr>
+              <a:t>rxPacket</a:t>
+            </a:r>
+            <a:r>
+              <a:rPr lang="en-US" sz="1200" dirty="0">
+                <a:solidFill>
+                  <a:schemeClr val="tx1"/>
+                </a:solidFill>
+              </a:rPr>
+              <a:t>-&gt;</a:t>
+            </a:r>
+            <a:r>
+              <a:rPr lang="en-US" sz="1200" dirty="0" err="1">
+                <a:solidFill>
+                  <a:schemeClr val="tx1"/>
+                </a:solidFill>
+              </a:rPr>
+              <a:t>dstAddr</a:t>
+            </a:r>
+            <a:r>
+              <a:rPr lang="en-US" sz="1200" dirty="0">
+                <a:solidFill>
+                  <a:schemeClr val="tx1"/>
+                </a:solidFill>
+              </a:rPr>
+              <a:t> = packet-&gt;</a:t>
+            </a:r>
+            <a:r>
+              <a:rPr lang="en-US" sz="1200" dirty="0" err="1">
+                <a:solidFill>
+                  <a:schemeClr val="tx1"/>
+                </a:solidFill>
+              </a:rPr>
+              <a:t>dst</a:t>
+            </a:r>
+            <a:r>
+              <a:rPr lang="en-US" sz="1200" dirty="0">
+                <a:solidFill>
+                  <a:schemeClr val="tx1"/>
+                </a:solidFill>
+              </a:rPr>
+              <a:t>;</a:t>
+            </a:r>
+          </a:p>
+          <a:p>
+            <a:r>
+              <a:rPr lang="en-US" sz="1200" dirty="0">
+                <a:solidFill>
+                  <a:schemeClr val="tx1"/>
+                </a:solidFill>
+              </a:rPr>
+              <a:t>                 </a:t>
+            </a:r>
+            <a:r>
+              <a:rPr lang="en-US" sz="1200" dirty="0" err="1">
+                <a:solidFill>
+                  <a:schemeClr val="tx1"/>
+                </a:solidFill>
+              </a:rPr>
+              <a:t>rxPacket</a:t>
+            </a:r>
+            <a:r>
+              <a:rPr lang="en-US" sz="1200" dirty="0">
+                <a:solidFill>
+                  <a:schemeClr val="tx1"/>
+                </a:solidFill>
+              </a:rPr>
+              <a:t>-&gt;payload = packet-&gt;data;</a:t>
+            </a:r>
+          </a:p>
+          <a:p>
+            <a:r>
+              <a:rPr lang="en-US" sz="1200" dirty="0">
+                <a:solidFill>
+                  <a:schemeClr val="tx1"/>
+                </a:solidFill>
+              </a:rPr>
+              <a:t>                 </a:t>
+            </a:r>
+            <a:r>
+              <a:rPr lang="en-US" sz="1200" dirty="0" err="1">
+                <a:solidFill>
+                  <a:schemeClr val="tx1"/>
+                </a:solidFill>
+              </a:rPr>
+              <a:t>rxPacket</a:t>
+            </a:r>
+            <a:r>
+              <a:rPr lang="en-US" sz="1200" dirty="0">
+                <a:solidFill>
+                  <a:schemeClr val="tx1"/>
+                </a:solidFill>
+              </a:rPr>
+              <a:t>-&gt;</a:t>
+            </a:r>
+            <a:r>
+              <a:rPr lang="en-US" sz="1200" dirty="0" err="1">
+                <a:solidFill>
+                  <a:schemeClr val="tx1"/>
+                </a:solidFill>
+              </a:rPr>
+              <a:t>rssi</a:t>
+            </a:r>
+            <a:r>
+              <a:rPr lang="en-US" sz="1200" dirty="0">
+                <a:solidFill>
+                  <a:schemeClr val="tx1"/>
+                </a:solidFill>
+              </a:rPr>
+              <a:t> = </a:t>
+            </a:r>
+            <a:r>
+              <a:rPr lang="en-US" sz="1200" dirty="0" err="1">
+                <a:solidFill>
+                  <a:schemeClr val="tx1"/>
+                </a:solidFill>
+              </a:rPr>
+              <a:t>rxStatistics.lastRssi</a:t>
+            </a:r>
+            <a:r>
+              <a:rPr lang="en-US" sz="1200" dirty="0">
+                <a:solidFill>
+                  <a:schemeClr val="tx1"/>
+                </a:solidFill>
+              </a:rPr>
+              <a:t>; </a:t>
+            </a:r>
+          </a:p>
+          <a:p>
+            <a:r>
+              <a:rPr lang="en-US" sz="1200" dirty="0">
+                <a:solidFill>
+                  <a:schemeClr val="tx1"/>
+                </a:solidFill>
+              </a:rPr>
+              <a:t>                 status = Success; </a:t>
+            </a:r>
+          </a:p>
+          <a:p>
             <a:endParaRPr lang="en-US" sz="1200" dirty="0">
               <a:solidFill>
                 <a:schemeClr val="tx1"/>
@@ -4544,16 +4965,13 @@
             </a:endParaRPr>
           </a:p>
           <a:p>
-            <a:pPr marL="228600" indent="-228600">
-              <a:buAutoNum type="arabicPlain"/>
-            </a:pPr>
-            <a:r>
-              <a:rPr lang="en-US" sz="1200" dirty="0">
-                <a:solidFill>
-                  <a:schemeClr val="tx1"/>
-                </a:solidFill>
-              </a:rPr>
-              <a:t>     result = </a:t>
+            <a:r>
+              <a:rPr lang="en-US" sz="1200" dirty="0">
+                <a:solidFill>
+                  <a:schemeClr val="tx1"/>
+                </a:solidFill>
+              </a:rPr>
+              <a:t>                 </a:t>
             </a:r>
             <a:r>
               <a:rPr lang="en-US" sz="1200" dirty="0" err="1">
@@ -4561,15 +4979,15 @@
                   <a:schemeClr val="tx1"/>
                 </a:solidFill>
               </a:rPr>
-              <a:t>nextEvent</a:t>
-            </a:r>
-            <a:r>
-              <a:rPr lang="en-US" sz="1200" dirty="0">
-                <a:solidFill>
-                  <a:schemeClr val="tx1"/>
-                </a:solidFill>
-              </a:rPr>
-              <a:t>(packet, </a:t>
+              <a:t>rxPacket</a:t>
+            </a:r>
+            <a:r>
+              <a:rPr lang="en-US" sz="1200" dirty="0">
+                <a:solidFill>
+                  <a:schemeClr val="tx1"/>
+                </a:solidFill>
+              </a:rPr>
+              <a:t>-&gt;</a:t>
             </a:r>
             <a:r>
               <a:rPr lang="en-US" sz="1200" dirty="0" err="1">
@@ -4577,15 +4995,15 @@
                   <a:schemeClr val="tx1"/>
                 </a:solidFill>
               </a:rPr>
-              <a:t>EventHandler</a:t>
-            </a:r>
-            <a:r>
-              <a:rPr lang="en-US" sz="1200" dirty="0">
-                <a:solidFill>
-                  <a:schemeClr val="tx1"/>
-                </a:solidFill>
-              </a:rPr>
-              <a:t>, </a:t>
+              <a:t>absTime</a:t>
+            </a:r>
+            <a:r>
+              <a:rPr lang="en-US" sz="1200" dirty="0">
+                <a:solidFill>
+                  <a:schemeClr val="tx1"/>
+                </a:solidFill>
+              </a:rPr>
+              <a:t> = </a:t>
             </a:r>
             <a:r>
               <a:rPr lang="en-US" sz="1200" dirty="0" err="1">
@@ -4593,107 +5011,7 @@
                   <a:schemeClr val="tx1"/>
                 </a:solidFill>
               </a:rPr>
-              <a:t>rxStatistics</a:t>
-            </a:r>
-            <a:r>
-              <a:rPr lang="en-US" sz="1200" dirty="0">
-                <a:solidFill>
-                  <a:schemeClr val="tx1"/>
-                </a:solidFill>
-              </a:rPr>
-              <a:t>);    </a:t>
-            </a:r>
-          </a:p>
-          <a:p>
-            <a:pPr marL="228600" indent="-228600">
-              <a:buAutoNum type="arabicPlain"/>
-            </a:pPr>
-            <a:r>
-              <a:rPr lang="en-US" sz="1200" dirty="0">
-                <a:solidFill>
-                  <a:schemeClr val="tx1"/>
-                </a:solidFill>
-              </a:rPr>
-              <a:t>     if (result &amp; </a:t>
-            </a:r>
-            <a:r>
-              <a:rPr lang="en-US" sz="1200" dirty="0" err="1">
-                <a:solidFill>
-                  <a:schemeClr val="tx1"/>
-                </a:solidFill>
-              </a:rPr>
-              <a:t>RF_EventLastCmdDone</a:t>
-            </a:r>
-            <a:r>
-              <a:rPr lang="en-US" sz="1200" dirty="0">
-                <a:solidFill>
-                  <a:schemeClr val="tx1"/>
-                </a:solidFill>
-              </a:rPr>
-              <a:t>)    {</a:t>
-            </a:r>
-          </a:p>
-          <a:p>
-            <a:pPr marL="228600" indent="-228600">
-              <a:buAutoNum type="arabicPlain"/>
-            </a:pPr>
-            <a:r>
-              <a:rPr lang="en-US" sz="1200" dirty="0">
-                <a:solidFill>
-                  <a:schemeClr val="tx1"/>
-                </a:solidFill>
-              </a:rPr>
-              <a:t>         if (</a:t>
-            </a:r>
-            <a:r>
-              <a:rPr lang="en-US" sz="1200" dirty="0" err="1">
-                <a:solidFill>
-                  <a:schemeClr val="tx1"/>
-                </a:solidFill>
-              </a:rPr>
-              <a:t>EventHandler.status</a:t>
-            </a:r>
-            <a:r>
-              <a:rPr lang="en-US" sz="1200" dirty="0">
-                <a:solidFill>
-                  <a:schemeClr val="tx1"/>
-                </a:solidFill>
-              </a:rPr>
-              <a:t> == PROP_DONE_OK)   { </a:t>
-            </a:r>
-          </a:p>
-          <a:p>
-            <a:pPr marL="228600" indent="-228600">
-              <a:buAutoNum type="arabicPlain"/>
-            </a:pPr>
-            <a:r>
-              <a:rPr lang="en-US" sz="1200" dirty="0">
-                <a:solidFill>
-                  <a:schemeClr val="tx1"/>
-                </a:solidFill>
-              </a:rPr>
-              <a:t>             if (packet-&gt;status != DATA_ENTRY_FINISHED)   {   </a:t>
-            </a:r>
-          </a:p>
-          <a:p>
-            <a:pPr marL="228600" indent="-228600">
-              <a:buAutoNum type="arabicPlain"/>
-            </a:pPr>
-            <a:r>
-              <a:rPr lang="en-US" sz="1200" dirty="0">
-                <a:solidFill>
-                  <a:schemeClr val="tx1"/>
-                </a:solidFill>
-              </a:rPr>
-              <a:t>                 status = </a:t>
-            </a:r>
-            <a:r>
-              <a:rPr lang="en-US" sz="1200" dirty="0" err="1">
-                <a:solidFill>
-                  <a:schemeClr val="tx1"/>
-                </a:solidFill>
-              </a:rPr>
-              <a:t>EasyLink_Status_Rx_Error</a:t>
+              <a:t>rxStats.timeStamp</a:t>
             </a:r>
             <a:r>
               <a:rPr lang="en-US" sz="1200" dirty="0">
@@ -4705,360 +5023,6 @@
             </a:r>
           </a:p>
           <a:p>
-            <a:pPr marL="228600" indent="-228600">
-              <a:buAutoNum type="arabicPlain"/>
-            </a:pPr>
-            <a:r>
-              <a:rPr lang="en-US" sz="1200" dirty="0">
-                <a:solidFill>
-                  <a:schemeClr val="tx1"/>
-                </a:solidFill>
-              </a:rPr>
-              <a:t>             }  else if (</a:t>
-            </a:r>
-            <a:r>
-              <a:rPr lang="en-US" sz="1200" dirty="0" err="1">
-                <a:solidFill>
-                  <a:schemeClr val="tx1"/>
-                </a:solidFill>
-              </a:rPr>
-              <a:t>rxStatistics.nRxOk</a:t>
-            </a:r>
-            <a:r>
-              <a:rPr lang="en-US" sz="1200" dirty="0">
-                <a:solidFill>
-                  <a:schemeClr val="tx1"/>
-                </a:solidFill>
-              </a:rPr>
-              <a:t> == 1 )  { </a:t>
-            </a:r>
-          </a:p>
-          <a:p>
-            <a:pPr marL="228600" indent="-228600">
-              <a:buAutoNum type="arabicPlain"/>
-            </a:pPr>
-            <a:r>
-              <a:rPr lang="en-US" sz="1200" dirty="0">
-                <a:solidFill>
-                  <a:schemeClr val="tx1"/>
-                </a:solidFill>
-              </a:rPr>
-              <a:t>                 </a:t>
-            </a:r>
-            <a:r>
-              <a:rPr lang="en-US" sz="1200" dirty="0" err="1">
-                <a:solidFill>
-                  <a:schemeClr val="tx1"/>
-                </a:solidFill>
-              </a:rPr>
-              <a:t>rxPacket</a:t>
-            </a:r>
-            <a:r>
-              <a:rPr lang="en-US" sz="1200" dirty="0">
-                <a:solidFill>
-                  <a:schemeClr val="tx1"/>
-                </a:solidFill>
-              </a:rPr>
-              <a:t>-&gt;</a:t>
-            </a:r>
-            <a:r>
-              <a:rPr lang="en-US" sz="1200" dirty="0" err="1">
-                <a:solidFill>
-                  <a:schemeClr val="tx1"/>
-                </a:solidFill>
-              </a:rPr>
-              <a:t>len</a:t>
-            </a:r>
-            <a:r>
-              <a:rPr lang="en-US" sz="1200" dirty="0">
-                <a:solidFill>
-                  <a:schemeClr val="tx1"/>
-                </a:solidFill>
-              </a:rPr>
-              <a:t> = *(uint8_t*)(&amp;packet-&gt;data) - </a:t>
-            </a:r>
-            <a:r>
-              <a:rPr lang="en-US" sz="1200" dirty="0" err="1">
-                <a:solidFill>
-                  <a:schemeClr val="tx1"/>
-                </a:solidFill>
-              </a:rPr>
-              <a:t>addrSize</a:t>
-            </a:r>
-            <a:r>
-              <a:rPr lang="en-US" sz="1200" dirty="0">
-                <a:solidFill>
-                  <a:schemeClr val="tx1"/>
-                </a:solidFill>
-              </a:rPr>
-              <a:t>;</a:t>
-            </a:r>
-          </a:p>
-          <a:p>
-            <a:pPr marL="228600" indent="-228600">
-              <a:buAutoNum type="arabicPlain"/>
-            </a:pPr>
-            <a:r>
-              <a:rPr lang="en-US" sz="1200" dirty="0">
-                <a:solidFill>
-                  <a:schemeClr val="tx1"/>
-                </a:solidFill>
-              </a:rPr>
-              <a:t>                 </a:t>
-            </a:r>
-            <a:r>
-              <a:rPr lang="en-US" sz="1200" dirty="0" err="1">
-                <a:solidFill>
-                  <a:schemeClr val="tx1"/>
-                </a:solidFill>
-              </a:rPr>
-              <a:t>rxPacket</a:t>
-            </a:r>
-            <a:r>
-              <a:rPr lang="en-US" sz="1200" dirty="0">
-                <a:solidFill>
-                  <a:schemeClr val="tx1"/>
-                </a:solidFill>
-              </a:rPr>
-              <a:t>-&gt;</a:t>
-            </a:r>
-            <a:r>
-              <a:rPr lang="en-US" sz="1200" dirty="0" err="1">
-                <a:solidFill>
-                  <a:schemeClr val="tx1"/>
-                </a:solidFill>
-              </a:rPr>
-              <a:t>dstAddr</a:t>
-            </a:r>
-            <a:r>
-              <a:rPr lang="en-US" sz="1200" dirty="0">
-                <a:solidFill>
-                  <a:schemeClr val="tx1"/>
-                </a:solidFill>
-              </a:rPr>
-              <a:t> = &amp;packet-&gt;data + 1;</a:t>
-            </a:r>
-          </a:p>
-          <a:p>
-            <a:pPr marL="228600" indent="-228600">
-              <a:buAutoNum type="arabicPlain"/>
-            </a:pPr>
-            <a:r>
-              <a:rPr lang="en-US" sz="1200" dirty="0">
-                <a:solidFill>
-                  <a:schemeClr val="tx1"/>
-                </a:solidFill>
-              </a:rPr>
-              <a:t>                 </a:t>
-            </a:r>
-            <a:r>
-              <a:rPr lang="en-US" sz="1200" dirty="0" err="1">
-                <a:solidFill>
-                  <a:schemeClr val="tx1"/>
-                </a:solidFill>
-              </a:rPr>
-              <a:t>rxPacket</a:t>
-            </a:r>
-            <a:r>
-              <a:rPr lang="en-US" sz="1200" dirty="0">
-                <a:solidFill>
-                  <a:schemeClr val="tx1"/>
-                </a:solidFill>
-              </a:rPr>
-              <a:t>-&gt;payload = &amp;packet-&gt;data + 1 + </a:t>
-            </a:r>
-            <a:r>
-              <a:rPr lang="en-US" sz="1200" dirty="0" err="1">
-                <a:solidFill>
-                  <a:schemeClr val="tx1"/>
-                </a:solidFill>
-              </a:rPr>
-              <a:t>addrSize</a:t>
-            </a:r>
-            <a:r>
-              <a:rPr lang="en-US" sz="1200" dirty="0">
-                <a:solidFill>
-                  <a:schemeClr val="tx1"/>
-                </a:solidFill>
-              </a:rPr>
-              <a:t>;</a:t>
-            </a:r>
-          </a:p>
-          <a:p>
-            <a:pPr marL="228600" indent="-228600">
-              <a:buAutoNum type="arabicPlain"/>
-            </a:pPr>
-            <a:r>
-              <a:rPr lang="en-US" sz="1200" dirty="0">
-                <a:solidFill>
-                  <a:schemeClr val="tx1"/>
-                </a:solidFill>
-              </a:rPr>
-              <a:t>                 </a:t>
-            </a:r>
-            <a:r>
-              <a:rPr lang="en-US" sz="1200" dirty="0" err="1">
-                <a:solidFill>
-                  <a:schemeClr val="tx1"/>
-                </a:solidFill>
-              </a:rPr>
-              <a:t>rxPacket</a:t>
-            </a:r>
-            <a:r>
-              <a:rPr lang="en-US" sz="1200" dirty="0">
-                <a:solidFill>
-                  <a:schemeClr val="tx1"/>
-                </a:solidFill>
-              </a:rPr>
-              <a:t>-&gt;</a:t>
-            </a:r>
-            <a:r>
-              <a:rPr lang="en-US" sz="1200" dirty="0" err="1">
-                <a:solidFill>
-                  <a:schemeClr val="tx1"/>
-                </a:solidFill>
-              </a:rPr>
-              <a:t>rssi</a:t>
-            </a:r>
-            <a:r>
-              <a:rPr lang="en-US" sz="1200" dirty="0">
-                <a:solidFill>
-                  <a:schemeClr val="tx1"/>
-                </a:solidFill>
-              </a:rPr>
-              <a:t> = </a:t>
-            </a:r>
-            <a:r>
-              <a:rPr lang="en-US" sz="1200" dirty="0" err="1">
-                <a:solidFill>
-                  <a:schemeClr val="tx1"/>
-                </a:solidFill>
-              </a:rPr>
-              <a:t>rxStatistics.lastRssi</a:t>
-            </a:r>
-            <a:r>
-              <a:rPr lang="en-US" sz="1200" dirty="0">
-                <a:solidFill>
-                  <a:schemeClr val="tx1"/>
-                </a:solidFill>
-              </a:rPr>
-              <a:t>; </a:t>
-            </a:r>
-          </a:p>
-          <a:p>
-            <a:pPr marL="228600" indent="-228600">
-              <a:buAutoNum type="arabicPlain"/>
-            </a:pPr>
-            <a:r>
-              <a:rPr lang="en-US" sz="1200" dirty="0">
-                <a:solidFill>
-                  <a:schemeClr val="tx1"/>
-                </a:solidFill>
-              </a:rPr>
-              <a:t>                 status = </a:t>
-            </a:r>
-            <a:r>
-              <a:rPr lang="en-US" sz="1200" dirty="0" err="1">
-                <a:solidFill>
-                  <a:schemeClr val="tx1"/>
-                </a:solidFill>
-              </a:rPr>
-              <a:t>EasyLink_Status_Success</a:t>
-            </a:r>
-            <a:r>
-              <a:rPr lang="en-US" sz="1200" dirty="0">
-                <a:solidFill>
-                  <a:schemeClr val="tx1"/>
-                </a:solidFill>
-              </a:rPr>
-              <a:t>; </a:t>
-            </a:r>
-          </a:p>
-          <a:p>
-            <a:pPr marL="228600" indent="-228600">
-              <a:buAutoNum type="arabicPlain"/>
-            </a:pPr>
-            <a:endParaRPr lang="en-US" sz="1200" dirty="0">
-              <a:solidFill>
-                <a:schemeClr val="tx1"/>
-              </a:solidFill>
-            </a:endParaRPr>
-          </a:p>
-          <a:p>
-            <a:pPr marL="228600" indent="-228600">
-              <a:buAutoNum type="arabicPlain"/>
-            </a:pPr>
-            <a:endParaRPr lang="en-US" sz="1200" dirty="0">
-              <a:solidFill>
-                <a:schemeClr val="tx1"/>
-              </a:solidFill>
-            </a:endParaRPr>
-          </a:p>
-          <a:p>
-            <a:pPr marL="228600" indent="-228600">
-              <a:buAutoNum type="arabicPlain"/>
-            </a:pPr>
-            <a:r>
-              <a:rPr lang="en-US" sz="1200" dirty="0">
-                <a:solidFill>
-                  <a:schemeClr val="tx1"/>
-                </a:solidFill>
-              </a:rPr>
-              <a:t>                 </a:t>
-            </a:r>
-            <a:r>
-              <a:rPr lang="en-US" sz="1200" dirty="0" err="1">
-                <a:solidFill>
-                  <a:schemeClr val="tx1"/>
-                </a:solidFill>
-              </a:rPr>
-              <a:t>rxPacket</a:t>
-            </a:r>
-            <a:r>
-              <a:rPr lang="en-US" sz="1200" dirty="0">
-                <a:solidFill>
-                  <a:schemeClr val="tx1"/>
-                </a:solidFill>
-              </a:rPr>
-              <a:t>-&gt;</a:t>
-            </a:r>
-            <a:r>
-              <a:rPr lang="en-US" sz="1200" dirty="0" err="1">
-                <a:solidFill>
-                  <a:schemeClr val="tx1"/>
-                </a:solidFill>
-              </a:rPr>
-              <a:t>absTime</a:t>
-            </a:r>
-            <a:r>
-              <a:rPr lang="en-US" sz="1200" dirty="0">
-                <a:solidFill>
-                  <a:schemeClr val="tx1"/>
-                </a:solidFill>
-              </a:rPr>
-              <a:t> = </a:t>
-            </a:r>
-            <a:r>
-              <a:rPr lang="en-US" sz="1200" dirty="0" err="1">
-                <a:solidFill>
-                  <a:schemeClr val="tx1"/>
-                </a:solidFill>
-              </a:rPr>
-              <a:t>rxStatistics.timeStamp</a:t>
-            </a:r>
-            <a:r>
-              <a:rPr lang="en-US" sz="1200" dirty="0">
-                <a:solidFill>
-                  <a:schemeClr val="tx1"/>
-                </a:solidFill>
-              </a:rPr>
-              <a:t>; </a:t>
-            </a:r>
-          </a:p>
-          <a:p>
-            <a:pPr marL="228600" indent="-228600">
-              <a:buAutoNum type="arabicPlain"/>
-            </a:pPr>
             <a:r>
               <a:rPr lang="en-US" sz="1200" dirty="0">
                 <a:solidFill>
@@ -5069,9 +5033,6 @@
             </a:r>
           </a:p>
           <a:p>
-            <a:pPr marL="228600" indent="-228600">
-              <a:buAutoNum type="arabicPlain"/>
-            </a:pPr>
             <a:r>
               <a:rPr lang="en-US" sz="1200" dirty="0">
                 <a:solidFill>
@@ -5082,22 +5043,6 @@
             </a:r>
           </a:p>
           <a:p>
-            <a:pPr marL="228600" indent="-228600">
-              <a:buAutoNum type="arabicPlain"/>
-            </a:pPr>
-            <a:r>
-              <a:rPr lang="en-US" sz="1200" dirty="0">
-                <a:solidFill>
-                  <a:schemeClr val="tx1"/>
-                </a:solidFill>
-              </a:rPr>
-              <a:t>     }</a:t>
-            </a:r>
-          </a:p>
-          <a:p>
-            <a:pPr marL="228600" indent="-228600">
-              <a:buAutoNum type="arabicPlain"/>
-            </a:pPr>
             <a:r>
               <a:rPr lang="en-US" sz="1200" dirty="0">
                 <a:solidFill>
@@ -5108,9 +5053,6 @@
             </a:r>
           </a:p>
           <a:p>
-            <a:pPr marL="228600" indent="-228600">
-              <a:buAutoNum type="arabicPlain"/>
-            </a:pPr>
             <a:r>
               <a:rPr lang="en-US" sz="1200" dirty="0">
                 <a:solidFill>
@@ -5124,10 +5066,10 @@
       </p:sp>
       <p:sp>
         <p:nvSpPr>
-          <p:cNvPr id="13" name="TextBox 12">
+          <p:cNvPr id="29" name="TextBox 28">
             <a:extLst>
               <a:ext uri="{FF2B5EF4-FFF2-40B4-BE49-F238E27FC236}">
-                <a16:creationId xmlns:a16="http://schemas.microsoft.com/office/drawing/2014/main" id="{8ADB68BF-9BFF-4FF4-9529-174171CD8259}"/>
+                <a16:creationId xmlns:a16="http://schemas.microsoft.com/office/drawing/2014/main" id="{128129DE-FE16-4B66-8A66-27EAEAAB38FB}"/>
               </a:ext>
             </a:extLst>
           </p:cNvPr>
@@ -5136,7 +5078,7 @@
         </p:nvSpPr>
         <p:spPr>
           <a:xfrm>
-            <a:off x="5469775" y="3473965"/>
+            <a:off x="4548291" y="2512433"/>
             <a:ext cx="1185949" cy="338554"/>
           </a:xfrm>
           <a:prstGeom prst="rect">
@@ -5163,10 +5105,10 @@
       </p:sp>
       <p:sp>
         <p:nvSpPr>
-          <p:cNvPr id="14" name="TextBox 13">
+          <p:cNvPr id="30" name="TextBox 29">
             <a:extLst>
               <a:ext uri="{FF2B5EF4-FFF2-40B4-BE49-F238E27FC236}">
-                <a16:creationId xmlns:a16="http://schemas.microsoft.com/office/drawing/2014/main" id="{51D3ABE6-319E-4C09-A4D3-8A0C02BA9825}"/>
+                <a16:creationId xmlns:a16="http://schemas.microsoft.com/office/drawing/2014/main" id="{0DF44325-0E0B-433C-A008-6B6DC1EC8D6C}"/>
               </a:ext>
             </a:extLst>
           </p:cNvPr>
@@ -5175,7 +5117,7 @@
         </p:nvSpPr>
         <p:spPr>
           <a:xfrm>
-            <a:off x="5043054" y="1099799"/>
+            <a:off x="4873078" y="708426"/>
             <a:ext cx="1185949" cy="338554"/>
           </a:xfrm>
           <a:prstGeom prst="rect">

</xml_diff>